<commit_message>
Final file at Last!!
</commit_message>
<xml_diff>
--- a/Presentations/Ns-3_presentation_F.pptx
+++ b/Presentations/Ns-3_presentation_F.pptx
@@ -5,18 +5,20 @@
     <p:sldMasterId id="2147483648" r:id="rId4"/>
   </p:sldMasterIdLst>
   <p:notesMasterIdLst>
-    <p:notesMasterId r:id="rId11"/>
+    <p:notesMasterId r:id="rId13"/>
   </p:notesMasterIdLst>
   <p:handoutMasterIdLst>
-    <p:handoutMasterId r:id="rId12"/>
+    <p:handoutMasterId r:id="rId14"/>
   </p:handoutMasterIdLst>
   <p:sldIdLst>
     <p:sldId id="256" r:id="rId5"/>
     <p:sldId id="277" r:id="rId6"/>
-    <p:sldId id="279" r:id="rId7"/>
-    <p:sldId id="282" r:id="rId8"/>
-    <p:sldId id="278" r:id="rId9"/>
-    <p:sldId id="281" r:id="rId10"/>
+    <p:sldId id="284" r:id="rId7"/>
+    <p:sldId id="279" r:id="rId8"/>
+    <p:sldId id="282" r:id="rId9"/>
+    <p:sldId id="283" r:id="rId10"/>
+    <p:sldId id="278" r:id="rId11"/>
+    <p:sldId id="281" r:id="rId12"/>
   </p:sldIdLst>
   <p:sldSz cx="12192000" cy="6858000"/>
   <p:notesSz cx="6858000" cy="9144000"/>
@@ -210,7 +212,7 @@
             <a:pPr rtl="0"/>
             <a:fld id="{F0EC7D35-77BB-4867-BAC6-5C40C37B98F1}" type="datetime1">
               <a:rPr lang="el-GR" smtClean="0"/>
-              <a:t>30/10/2025</a:t>
+              <a:t>3/11/2025</a:t>
             </a:fld>
             <a:endParaRPr lang="el-GR" dirty="0"/>
           </a:p>
@@ -380,7 +382,7 @@
             <a:pPr rtl="0"/>
             <a:fld id="{707ABAE7-72BE-4378-9C66-B300388DE536}" type="datetime1">
               <a:rPr lang="el-GR" noProof="0" smtClean="0"/>
-              <a:t>30/10/2025</a:t>
+              <a:t>3/11/2025</a:t>
             </a:fld>
             <a:endParaRPr lang="el-GR" noProof="0" dirty="0"/>
           </a:p>
@@ -9647,7 +9649,7 @@
             <a:pPr rtl="0"/>
             <a:fld id="{EABDBA74-E4DB-4313-95D3-B7F630EE7B7F}" type="datetime1">
               <a:rPr lang="el-GR" noProof="0" smtClean="0"/>
-              <a:t>30/10/2025</a:t>
+              <a:t>3/11/2025</a:t>
             </a:fld>
             <a:endParaRPr lang="el-GR" noProof="0" dirty="0"/>
           </a:p>
@@ -9856,7 +9858,7 @@
             <a:pPr rtl="0"/>
             <a:fld id="{D9C97E28-F60A-427B-851A-BCC048F06BC7}" type="datetime1">
               <a:rPr lang="el-GR" noProof="0" smtClean="0"/>
-              <a:t>30/10/2025</a:t>
+              <a:t>3/11/2025</a:t>
             </a:fld>
             <a:endParaRPr lang="el-GR" noProof="0" dirty="0"/>
           </a:p>
@@ -10038,7 +10040,7 @@
             <a:pPr rtl="0"/>
             <a:fld id="{4EA33EDB-81C3-4DAA-87EA-DA21D6A7FC6C}" type="datetime1">
               <a:rPr lang="el-GR" noProof="0" smtClean="0"/>
-              <a:t>30/10/2025</a:t>
+              <a:t>3/11/2025</a:t>
             </a:fld>
             <a:endParaRPr lang="el-GR" noProof="0" dirty="0"/>
           </a:p>
@@ -10245,7 +10247,7 @@
             <a:pPr rtl="0"/>
             <a:fld id="{0FE5ACA5-56F5-4208-8101-108DA68822C6}" type="datetime1">
               <a:rPr lang="el-GR" noProof="0" smtClean="0"/>
-              <a:t>30/10/2025</a:t>
+              <a:t>3/11/2025</a:t>
             </a:fld>
             <a:endParaRPr lang="el-GR" noProof="0" dirty="0"/>
           </a:p>
@@ -19159,7 +19161,7 @@
             <a:pPr rtl="0"/>
             <a:fld id="{98AAE694-814A-4F58-A8E2-AA9B6575E0B5}" type="datetime1">
               <a:rPr lang="el-GR" noProof="0" smtClean="0"/>
-              <a:t>30/10/2025</a:t>
+              <a:t>3/11/2025</a:t>
             </a:fld>
             <a:endParaRPr lang="el-GR" noProof="0" dirty="0"/>
           </a:p>
@@ -19435,7 +19437,7 @@
             <a:pPr rtl="0"/>
             <a:fld id="{98B30D4A-F623-45A5-BE49-543B4B609AF2}" type="datetime1">
               <a:rPr lang="el-GR" noProof="0" smtClean="0"/>
-              <a:t>30/10/2025</a:t>
+              <a:t>3/11/2025</a:t>
             </a:fld>
             <a:endParaRPr lang="el-GR" noProof="0" dirty="0"/>
           </a:p>
@@ -19835,7 +19837,7 @@
             <a:pPr rtl="0"/>
             <a:fld id="{06412F62-D18F-463A-9A7E-E4809AAD76E4}" type="datetime1">
               <a:rPr lang="el-GR" noProof="0" smtClean="0"/>
-              <a:t>30/10/2025</a:t>
+              <a:t>3/11/2025</a:t>
             </a:fld>
             <a:endParaRPr lang="el-GR" noProof="0" dirty="0"/>
           </a:p>
@@ -19955,7 +19957,7 @@
             <a:pPr rtl="0"/>
             <a:fld id="{D2009D47-CF8A-48CB-81B8-5988DBFADA28}" type="datetime1">
               <a:rPr lang="el-GR" noProof="0" smtClean="0"/>
-              <a:t>30/10/2025</a:t>
+              <a:t>3/11/2025</a:t>
             </a:fld>
             <a:endParaRPr lang="el-GR" noProof="0" dirty="0"/>
           </a:p>
@@ -20051,7 +20053,7 @@
             <a:pPr rtl="0"/>
             <a:fld id="{89B075A6-4B0E-489A-92E5-C2C81D969D11}" type="datetime1">
               <a:rPr lang="el-GR" noProof="0" smtClean="0"/>
-              <a:t>30/10/2025</a:t>
+              <a:t>3/11/2025</a:t>
             </a:fld>
             <a:endParaRPr lang="el-GR" noProof="0" dirty="0"/>
           </a:p>
@@ -20343,7 +20345,7 @@
             <a:pPr rtl="0"/>
             <a:fld id="{7C290451-C354-46E0-BBD8-0317D7A1384C}" type="datetime1">
               <a:rPr lang="el-GR" noProof="0" smtClean="0"/>
-              <a:t>30/10/2025</a:t>
+              <a:t>3/11/2025</a:t>
             </a:fld>
             <a:endParaRPr lang="el-GR" noProof="0" dirty="0"/>
           </a:p>
@@ -20626,7 +20628,7 @@
             <a:pPr rtl="0"/>
             <a:fld id="{05DAA40D-D363-46A0-9276-B6A4797DC9A5}" type="datetime1">
               <a:rPr lang="el-GR" noProof="0" smtClean="0"/>
-              <a:t>30/10/2025</a:t>
+              <a:t>3/11/2025</a:t>
             </a:fld>
             <a:endParaRPr lang="el-GR" noProof="0" dirty="0"/>
           </a:p>
@@ -20875,7 +20877,7 @@
           <a:p>
             <a:fld id="{F98FDC76-A1F5-4EE8-BDE3-5EFC56AAE7AD}" type="datetime1">
               <a:rPr lang="el-GR" noProof="0" smtClean="0"/>
-              <a:t>30/10/2025</a:t>
+              <a:t>3/11/2025</a:t>
             </a:fld>
             <a:endParaRPr lang="el-GR" noProof="0" dirty="0"/>
           </a:p>
@@ -21760,7 +21762,7 @@
         </p:nvSpPr>
         <p:spPr>
           <a:xfrm>
-            <a:off x="1024128" y="585216"/>
+            <a:off x="1024128" y="510568"/>
             <a:ext cx="9720072" cy="1499616"/>
           </a:xfrm>
         </p:spPr>
@@ -21771,8 +21773,8 @@
           <a:lstStyle/>
           <a:p>
             <a:r>
-              <a:rPr lang="el-GR" b="1" dirty="0"/>
-              <a:t>Κυριο θεμα της εργασιασ</a:t>
+              <a:rPr lang="el-GR" sz="4800" b="1" dirty="0"/>
+              <a:t>Κυριο θεμα της εργασιασ (1)</a:t>
             </a:r>
           </a:p>
         </p:txBody>
@@ -21793,9 +21795,16 @@
             <p:ph idx="1"/>
           </p:nvPr>
         </p:nvSpPr>
-        <p:spPr/>
+        <p:spPr>
+          <a:xfrm>
+            <a:off x="793102" y="2286000"/>
+            <a:ext cx="10758196" cy="4023360"/>
+          </a:xfrm>
+        </p:spPr>
         <p:txBody>
-          <a:bodyPr/>
+          <a:bodyPr>
+            <a:normAutofit/>
+          </a:bodyPr>
           <a:lstStyle/>
           <a:p>
             <a:pPr algn="just">
@@ -21804,7 +21813,7 @@
             </a:pPr>
             <a:r>
               <a:rPr lang="el-GR" dirty="0"/>
-              <a:t>Προσομοιώσαμε την λειτουργία μιας σύνδεσης </a:t>
+              <a:t>Προσομοίωση λειτουργίας μιας σύνδεσης </a:t>
             </a:r>
             <a:r>
               <a:rPr lang="en-US" dirty="0"/>
@@ -21812,9 +21821,22 @@
             </a:r>
             <a:r>
               <a:rPr lang="el-GR" dirty="0"/>
-              <a:t>στην οποία στέλνονται πακέτα από το έναν κόμβο στον άλλον.</a:t>
+              <a:t>χρησιμοποιώντας το </a:t>
             </a:r>
-            <a:endParaRPr lang="en-US" dirty="0"/>
+            <a:r>
+              <a:rPr lang="en-US" dirty="0"/>
+              <a:t>NS-3</a:t>
+            </a:r>
+            <a:r>
+              <a:rPr lang="el-GR" dirty="0"/>
+              <a:t>, στην οποία στέλνονται πακέτα από το έναν κόμβο στον άλλον </a:t>
+            </a:r>
+          </a:p>
+          <a:p>
+            <a:pPr marL="0" indent="0" algn="just">
+              <a:buNone/>
+            </a:pPr>
+            <a:endParaRPr lang="en-US" sz="1200" dirty="0"/>
           </a:p>
           <a:p>
             <a:pPr algn="just">
@@ -21822,20 +21844,51 @@
               <a:buChar char="•"/>
             </a:pPr>
             <a:r>
+              <a:rPr lang="en-US" dirty="0"/>
+              <a:t>H </a:t>
+            </a:r>
+            <a:r>
               <a:rPr lang="el-GR" dirty="0"/>
-              <a:t>Η μετάδοση αυτή έγινε με την τεχνική του </a:t>
+              <a:t>προσομοίωση θα χωρίζεται βασικά σε δύο μέρη </a:t>
             </a:r>
             <a:r>
               <a:rPr lang="en-US" dirty="0"/>
-              <a:t>UDP-echo (more info about UDP-echo</a:t>
+              <a:t>:</a:t>
+            </a:r>
+            <a:endParaRPr lang="el-GR" dirty="0"/>
+          </a:p>
+          <a:p>
+            <a:pPr marL="0" indent="0">
+              <a:buNone/>
+            </a:pPr>
+            <a:endParaRPr lang="en-US" sz="1000" dirty="0"/>
+          </a:p>
+          <a:p>
+            <a:pPr marL="173736" lvl="1" indent="0">
+              <a:buNone/>
+            </a:pPr>
+            <a:r>
+              <a:rPr lang="en-US" dirty="0">
+                <a:solidFill>
+                  <a:schemeClr val="accent1">
+                    <a:lumMod val="75000"/>
+                  </a:schemeClr>
+                </a:solidFill>
+              </a:rPr>
+              <a:t>1)</a:t>
+            </a:r>
+            <a:r>
+              <a:rPr lang="en-US" dirty="0"/>
+              <a:t> </a:t>
             </a:r>
             <a:r>
               <a:rPr lang="el-GR" dirty="0"/>
-              <a:t> :</a:t>
+              <a:t>Προσομοίωση μιας απλής σύνδεσης σημείου-προς-σημείο μεταξύ δύο κόμβων,  με προϋπόθεση η  μετάδοση να γίνει με την τεχνική του </a:t>
             </a:r>
-            <a:br>
-              <a:rPr lang="el-GR" dirty="0"/>
-            </a:br>
+            <a:r>
+              <a:rPr lang="en-US" dirty="0"/>
+              <a:t>UDP-echo (</a:t>
+            </a:r>
             <a:r>
               <a:rPr lang="el-GR" dirty="0"/>
               <a:t>«</a:t>
@@ -21848,41 +21901,31 @@
               <a:rPr lang="el-GR" dirty="0"/>
               <a:t>» ).</a:t>
             </a:r>
+          </a:p>
+          <a:p>
+            <a:pPr marL="173736" lvl="1" indent="0">
+              <a:buNone/>
+            </a:pPr>
+            <a:r>
+              <a:rPr lang="el-GR" dirty="0">
+                <a:solidFill>
+                  <a:schemeClr val="accent1">
+                    <a:lumMod val="75000"/>
+                  </a:schemeClr>
+                </a:solidFill>
+              </a:rPr>
+              <a:t>2) </a:t>
+            </a:r>
+            <a:r>
+              <a:rPr lang="el-GR" dirty="0"/>
+              <a:t>Προσομοίωση ενός πιο πολύπλοκου δικτύου με δυναμική δρομολόγηση, δημιουργία ροών πακέτων, εισαγωγή αποτυχίας συνδέσεων και ανάλυση απώλειας πακέτων.</a:t>
+            </a:r>
             <a:endParaRPr lang="en-US" dirty="0"/>
           </a:p>
           <a:p>
-            <a:pPr algn="just">
-              <a:buFont typeface="Arial" panose="020B0604020202020204" pitchFamily="34" charset="0"/>
-              <a:buChar char="•"/>
+            <a:pPr marL="0" indent="0" algn="just">
+              <a:buNone/>
             </a:pPr>
-            <a:r>
-              <a:rPr lang="el-GR" dirty="0"/>
-              <a:t>Έχουμε 2 </a:t>
-            </a:r>
-            <a:r>
-              <a:rPr lang="en-US" dirty="0"/>
-              <a:t>servers </a:t>
-            </a:r>
-            <a:r>
-              <a:rPr lang="el-GR" dirty="0"/>
-              <a:t>(κόμβος 1) που εξυπηρετούν 2 πελάτες (κόμβος 0)</a:t>
-            </a:r>
-            <a:r>
-              <a:rPr lang="en-US" dirty="0"/>
-              <a:t>.</a:t>
-            </a:r>
-            <a:r>
-              <a:rPr lang="el-GR" dirty="0"/>
-              <a:t> Στην διάταξη αυτή, οι πελάτες παίρνουν διευθύνσεις από τους </a:t>
-            </a:r>
-            <a:r>
-              <a:rPr lang="en-US" dirty="0"/>
-              <a:t>servers</a:t>
-            </a:r>
-            <a:r>
-              <a:rPr lang="el-GR" dirty="0"/>
-              <a:t> αφού πρώτα  εγκαθιδρυθεί η σύνδεση μεταξύ τους.</a:t>
-            </a:r>
             <a:endParaRPr lang="en-US" dirty="0"/>
           </a:p>
         </p:txBody>
@@ -21922,6 +21965,179 @@
       </p:grpSpPr>
       <p:sp>
         <p:nvSpPr>
+          <p:cNvPr id="4" name="Τίτλος 1">
+            <a:extLst>
+              <a:ext uri="{FF2B5EF4-FFF2-40B4-BE49-F238E27FC236}">
+                <a16:creationId xmlns:a16="http://schemas.microsoft.com/office/drawing/2014/main" id="{D774839F-51E4-E46D-4EE5-1DF8B9BC855B}"/>
+              </a:ext>
+            </a:extLst>
+          </p:cNvPr>
+          <p:cNvSpPr>
+            <a:spLocks noGrp="1"/>
+          </p:cNvSpPr>
+          <p:nvPr>
+            <p:ph type="title"/>
+          </p:nvPr>
+        </p:nvSpPr>
+        <p:spPr>
+          <a:xfrm>
+            <a:off x="1024128" y="839755"/>
+            <a:ext cx="9720072" cy="899830"/>
+          </a:xfrm>
+        </p:spPr>
+        <p:txBody>
+          <a:bodyPr rtlCol="0">
+            <a:normAutofit/>
+          </a:bodyPr>
+          <a:lstStyle/>
+          <a:p>
+            <a:r>
+              <a:rPr lang="el-GR" sz="4800" b="1" dirty="0"/>
+              <a:t>Κυριο θεμα της εργασιασ (2)</a:t>
+            </a:r>
+          </a:p>
+        </p:txBody>
+      </p:sp>
+      <p:sp>
+        <p:nvSpPr>
+          <p:cNvPr id="5" name="Θέση περιεχομένου 2">
+            <a:extLst>
+              <a:ext uri="{FF2B5EF4-FFF2-40B4-BE49-F238E27FC236}">
+                <a16:creationId xmlns:a16="http://schemas.microsoft.com/office/drawing/2014/main" id="{784F8DDC-B6BC-8339-BE2C-10A96FCD8576}"/>
+              </a:ext>
+            </a:extLst>
+          </p:cNvPr>
+          <p:cNvSpPr>
+            <a:spLocks noGrp="1"/>
+          </p:cNvSpPr>
+          <p:nvPr>
+            <p:ph idx="1"/>
+          </p:nvPr>
+        </p:nvSpPr>
+        <p:spPr>
+          <a:xfrm>
+            <a:off x="317241" y="2182483"/>
+            <a:ext cx="11457992" cy="3614468"/>
+          </a:xfrm>
+        </p:spPr>
+        <p:txBody>
+          <a:bodyPr>
+            <a:noAutofit/>
+          </a:bodyPr>
+          <a:lstStyle/>
+          <a:p>
+            <a:pPr marL="0" indent="0">
+              <a:buNone/>
+            </a:pPr>
+            <a:r>
+              <a:rPr lang="el-GR" dirty="0"/>
+              <a:t>Πιο συγκεκριμένα για τα δύο μέρη της εργασίας </a:t>
+            </a:r>
+            <a:r>
+              <a:rPr lang="en-US" dirty="0"/>
+              <a:t>:</a:t>
+            </a:r>
+            <a:endParaRPr lang="el-GR" dirty="0"/>
+          </a:p>
+          <a:p>
+            <a:pPr marL="457200" indent="-457200">
+              <a:buFont typeface="+mj-lt"/>
+              <a:buAutoNum type="arabicPeriod"/>
+            </a:pPr>
+            <a:r>
+              <a:rPr lang="el-GR" sz="2000" dirty="0"/>
+              <a:t>Στην προσομοίωση σημείο</a:t>
+            </a:r>
+            <a:r>
+              <a:rPr lang="en-US" sz="2000" dirty="0"/>
+              <a:t> </a:t>
+            </a:r>
+            <a:r>
+              <a:rPr lang="el-GR" sz="2000" dirty="0"/>
+              <a:t>προς</a:t>
+            </a:r>
+            <a:r>
+              <a:rPr lang="en-US" sz="2000" dirty="0"/>
+              <a:t> </a:t>
+            </a:r>
+            <a:r>
+              <a:rPr lang="el-GR" sz="2000" dirty="0"/>
+              <a:t>σημείο δημιουργείται μια προσομοίωση με 2 κόμβους. Ορίζονται τα χαρακτηριστικά της σύνδεσης και αντιστοιχίζονται διευθύνσεις τύπου ipv4 στις διεπαφές των κόμβων.</a:t>
+            </a:r>
+            <a:br>
+              <a:rPr lang="el-GR" sz="2000" dirty="0"/>
+            </a:br>
+            <a:endParaRPr lang="el-GR" sz="2000" dirty="0"/>
+          </a:p>
+          <a:p>
+            <a:pPr marL="457200" indent="-457200">
+              <a:buFont typeface="+mj-lt"/>
+              <a:buAutoNum type="arabicPeriod"/>
+            </a:pPr>
+            <a:r>
+              <a:rPr lang="el-GR" sz="2000" dirty="0"/>
+              <a:t> Τέλος, υλοποιήθηκαν δύο servers UDP echo στον κόμβο 1 σε διαφορετικές θύρες με δημιουργία δύο πελατών  UDP echo στον κόμβο 0. </a:t>
+            </a:r>
+            <a:br>
+              <a:rPr lang="el-GR" sz="2000" dirty="0"/>
+            </a:br>
+            <a:endParaRPr lang="el-GR" sz="2000" dirty="0"/>
+          </a:p>
+          <a:p>
+            <a:pPr marL="457200" indent="-457200">
+              <a:buFont typeface="+mj-lt"/>
+              <a:buAutoNum type="arabicPeriod"/>
+            </a:pPr>
+            <a:r>
+              <a:rPr lang="el-GR" sz="2000" dirty="0"/>
+              <a:t>Εκτέλεση της προσομοίωσης και καταγραφή των δεδομένων ροής με χρήση </a:t>
+            </a:r>
+            <a:r>
+              <a:rPr lang="en-US" sz="2000" dirty="0"/>
+              <a:t>Flow-Monitoring</a:t>
+            </a:r>
+            <a:r>
+              <a:rPr lang="el-GR" sz="2000" dirty="0"/>
+              <a:t> (πακέτα, καθυστέρηση, εύρος ζώνης).</a:t>
+            </a:r>
+          </a:p>
+        </p:txBody>
+      </p:sp>
+    </p:spTree>
+    <p:extLst>
+      <p:ext uri="{BB962C8B-B14F-4D97-AF65-F5344CB8AC3E}">
+        <p14:creationId xmlns:p14="http://schemas.microsoft.com/office/powerpoint/2010/main" val="3077155193"/>
+      </p:ext>
+    </p:extLst>
+  </p:cSld>
+  <p:clrMapOvr>
+    <a:masterClrMapping/>
+  </p:clrMapOvr>
+  <p:transition spd="slow">
+    <p:push dir="u"/>
+  </p:transition>
+</p:sld>
+</file>
+
+<file path=ppt/slides/slide4.xml><?xml version="1.0" encoding="utf-8"?>
+<p:sld xmlns:a="http://schemas.openxmlformats.org/drawingml/2006/main" xmlns:r="http://schemas.openxmlformats.org/officeDocument/2006/relationships" xmlns:p="http://schemas.openxmlformats.org/presentationml/2006/main">
+  <p:cSld>
+    <p:spTree>
+      <p:nvGrpSpPr>
+        <p:cNvPr id="1" name=""/>
+        <p:cNvGrpSpPr/>
+        <p:nvPr/>
+      </p:nvGrpSpPr>
+      <p:grpSpPr>
+        <a:xfrm>
+          <a:off x="0" y="0"/>
+          <a:ext cx="0" cy="0"/>
+          <a:chOff x="0" y="0"/>
+          <a:chExt cx="0" cy="0"/>
+        </a:xfrm>
+      </p:grpSpPr>
+      <p:sp>
+        <p:nvSpPr>
           <p:cNvPr id="2" name="Τίτλος 1">
             <a:extLst>
               <a:ext uri="{FF2B5EF4-FFF2-40B4-BE49-F238E27FC236}">
@@ -21936,14 +22152,23 @@
             <p:ph type="title"/>
           </p:nvPr>
         </p:nvSpPr>
-        <p:spPr/>
+        <p:spPr>
+          <a:xfrm>
+            <a:off x="837516" y="547893"/>
+            <a:ext cx="11167872" cy="1499616"/>
+          </a:xfrm>
+        </p:spPr>
         <p:txBody>
           <a:bodyPr/>
           <a:lstStyle/>
           <a:p>
             <a:r>
+              <a:rPr lang="el-GR" sz="4800" b="1" dirty="0"/>
+              <a:t>ΒΗΜΑΤΑ</a:t>
+            </a:r>
+            <a:r>
               <a:rPr lang="el-GR" b="1" dirty="0"/>
-              <a:t>ΒΗΜΑΤΑ ΥΛΟΠΟΙΗΣΗΣ ΤΗΣ ΕΡΓΑΣΙΑΣ</a:t>
+              <a:t> ΥΛΟΠΟΙΗΣΗΣ ΤΗΣ ΕΡΓΑΣΙΑΣ</a:t>
             </a:r>
             <a:r>
               <a:rPr lang="en-US" b="1" dirty="0"/>
@@ -21969,7 +22194,12 @@
             <p:ph idx="1"/>
           </p:nvPr>
         </p:nvSpPr>
-        <p:spPr/>
+        <p:spPr>
+          <a:xfrm>
+            <a:off x="1024128" y="2220683"/>
+            <a:ext cx="9720073" cy="4023360"/>
+          </a:xfrm>
+        </p:spPr>
         <p:txBody>
           <a:bodyPr>
             <a:normAutofit/>
@@ -22030,7 +22260,15 @@
             </a:r>
             <a:r>
               <a:rPr lang="el-GR" dirty="0"/>
-              <a:t>για την επικοινωνία και συγχρονισμό των μελών της ομάδας.</a:t>
+              <a:t>και </a:t>
+            </a:r>
+            <a:r>
+              <a:rPr lang="en-US" dirty="0"/>
+              <a:t>GitHub </a:t>
+            </a:r>
+            <a:r>
+              <a:rPr lang="el-GR" dirty="0"/>
+              <a:t>για την επικοινωνία και τον συγχρονισμό των μελών της ομάδας.</a:t>
             </a:r>
             <a:endParaRPr lang="en-US" dirty="0"/>
           </a:p>
@@ -22058,7 +22296,7 @@
         </p:blipFill>
         <p:spPr>
           <a:xfrm>
-            <a:off x="8973179" y="4618275"/>
+            <a:off x="7092617" y="4618273"/>
             <a:ext cx="2119364" cy="2119364"/>
           </a:xfrm>
           <a:prstGeom prst="rect">
@@ -22088,7 +22326,7 @@
         </p:blipFill>
         <p:spPr>
           <a:xfrm>
-            <a:off x="925391" y="4316772"/>
+            <a:off x="507542" y="4316771"/>
             <a:ext cx="2722370" cy="2722370"/>
           </a:xfrm>
           <a:prstGeom prst="rect">
@@ -22118,8 +22356,38 @@
         </p:blipFill>
         <p:spPr>
           <a:xfrm>
-            <a:off x="4955040" y="4777844"/>
+            <a:off x="3816355" y="4777843"/>
             <a:ext cx="2543175" cy="1800225"/>
+          </a:xfrm>
+          <a:prstGeom prst="rect">
+            <a:avLst/>
+          </a:prstGeom>
+        </p:spPr>
+      </p:pic>
+      <p:pic>
+        <p:nvPicPr>
+          <p:cNvPr id="6" name="Picture 5" descr="A black background with a black square&#10;&#10;AI-generated content may be incorrect.">
+            <a:extLst>
+              <a:ext uri="{FF2B5EF4-FFF2-40B4-BE49-F238E27FC236}">
+                <a16:creationId xmlns:a16="http://schemas.microsoft.com/office/drawing/2014/main" id="{46213963-0CDF-A7D0-0F23-FA0301AA6534}"/>
+              </a:ext>
+            </a:extLst>
+          </p:cNvPr>
+          <p:cNvPicPr>
+            <a:picLocks noChangeAspect="1"/>
+          </p:cNvPicPr>
+          <p:nvPr/>
+        </p:nvPicPr>
+        <p:blipFill>
+          <a:blip r:embed="rId5"/>
+          <a:stretch>
+            <a:fillRect/>
+          </a:stretch>
+        </p:blipFill>
+        <p:spPr>
+          <a:xfrm>
+            <a:off x="9444899" y="4857097"/>
+            <a:ext cx="2918604" cy="1641715"/>
           </a:xfrm>
           <a:prstGeom prst="rect">
             <a:avLst/>
@@ -22142,7 +22410,7 @@
 </p:sld>
 </file>
 
-<file path=ppt/slides/slide4.xml><?xml version="1.0" encoding="utf-8"?>
+<file path=ppt/slides/slide5.xml><?xml version="1.0" encoding="utf-8"?>
 <p:sld xmlns:a="http://schemas.openxmlformats.org/drawingml/2006/main" xmlns:r="http://schemas.openxmlformats.org/officeDocument/2006/relationships" xmlns:p="http://schemas.openxmlformats.org/presentationml/2006/main">
   <p:cSld>
     <p:spTree>
@@ -22183,8 +22451,8 @@
         </p:nvSpPr>
         <p:spPr>
           <a:xfrm>
-            <a:off x="1024128" y="585216"/>
-            <a:ext cx="9720072" cy="1338942"/>
+            <a:off x="921492" y="678522"/>
+            <a:ext cx="11357594" cy="1338942"/>
           </a:xfrm>
         </p:spPr>
         <p:txBody>
@@ -22229,17 +22497,17 @@
         </p:nvSpPr>
         <p:spPr>
           <a:xfrm>
-            <a:off x="1134882" y="2898459"/>
-            <a:ext cx="4749282" cy="3008005"/>
+            <a:off x="653141" y="2319962"/>
+            <a:ext cx="6587413" cy="4204749"/>
           </a:xfrm>
         </p:spPr>
         <p:txBody>
           <a:bodyPr>
-            <a:normAutofit/>
+            <a:noAutofit/>
           </a:bodyPr>
           <a:lstStyle/>
           <a:p>
-            <a:pPr algn="just">
+            <a:pPr>
               <a:buFont typeface="Arial" panose="020B0604020202020204" pitchFamily="34" charset="0"/>
               <a:buChar char="•"/>
             </a:pPr>
@@ -22248,47 +22516,105 @@
               <a:t> </a:t>
             </a:r>
             <a:r>
-              <a:rPr lang="el-GR" sz="2000" dirty="0"/>
-              <a:t>Μελετήσαμε την βιβλιογραφία του </a:t>
+              <a:rPr lang="el-GR" dirty="0"/>
+              <a:t>Δημιουργία ενός repository στο </a:t>
             </a:r>
             <a:r>
-              <a:rPr lang="en-US" sz="2000" dirty="0"/>
+              <a:rPr lang="en-US" dirty="0"/>
+              <a:t>GitHub </a:t>
+            </a:r>
+            <a:r>
+              <a:rPr lang="el-GR" dirty="0"/>
+              <a:t>σε αρχικό στάδιο με ελλειπές υλικό για την ώρα (γι</a:t>
+            </a:r>
+            <a:r>
+              <a:rPr lang="en-US" dirty="0"/>
+              <a:t>’</a:t>
+            </a:r>
+            <a:r>
+              <a:rPr lang="el-GR" dirty="0"/>
+              <a:t>αυτό και </a:t>
+            </a:r>
+            <a:r>
+              <a:rPr lang="en-US" dirty="0"/>
+              <a:t>private)</a:t>
+            </a:r>
+            <a:r>
+              <a:rPr lang="el-GR" dirty="0"/>
+              <a:t> και με στόχο να γίνει </a:t>
+            </a:r>
+            <a:r>
+              <a:rPr lang="en-US" dirty="0"/>
+              <a:t>public </a:t>
+            </a:r>
+            <a:r>
+              <a:rPr lang="el-GR" dirty="0"/>
+              <a:t>όταν ολοκληρωθεί. </a:t>
+            </a:r>
+          </a:p>
+          <a:p>
+            <a:pPr>
+              <a:buFont typeface="Arial" panose="020B0604020202020204" pitchFamily="34" charset="0"/>
+              <a:buChar char="•"/>
+            </a:pPr>
+            <a:r>
+              <a:rPr lang="el-GR" dirty="0"/>
+              <a:t>Μελέτη  της βιβλιογραφίας του </a:t>
+            </a:r>
+            <a:r>
+              <a:rPr lang="en-US" dirty="0"/>
               <a:t>NS-3</a:t>
             </a:r>
             <a:r>
-              <a:rPr lang="el-GR" sz="2000" dirty="0"/>
-              <a:t> και πιο συγκεκριμένα το  </a:t>
+              <a:rPr lang="el-GR" dirty="0"/>
+              <a:t> και πιο συγκεκριμένα του </a:t>
             </a:r>
             <a:r>
-              <a:rPr lang="en-US" sz="2000" dirty="0"/>
+              <a:rPr lang="en-US" dirty="0"/>
               <a:t>“ns-3 tutorial” </a:t>
             </a:r>
             <a:r>
-              <a:rPr lang="el-GR" sz="2000" dirty="0"/>
+              <a:rPr lang="el-GR" dirty="0"/>
               <a:t>για απλά παραδείγματα χρήσης του νέου αυτού εργαλείου.</a:t>
             </a:r>
           </a:p>
           <a:p>
-            <a:pPr algn="just">
+            <a:pPr>
               <a:buFont typeface="Arial" panose="020B0604020202020204" pitchFamily="34" charset="0"/>
               <a:buChar char="•"/>
             </a:pPr>
             <a:r>
-              <a:rPr lang="el-GR" sz="2000" dirty="0"/>
-              <a:t>Στην συνέχεια ανατρέξαμε στο </a:t>
+              <a:rPr lang="el-GR" dirty="0"/>
+              <a:t>Αναζήτηση στο </a:t>
             </a:r>
             <a:r>
-              <a:rPr lang="en-US" sz="2000" dirty="0"/>
+              <a:rPr lang="en-US" dirty="0"/>
               <a:t>“ns-3 Model Library” </a:t>
             </a:r>
             <a:r>
-              <a:rPr lang="el-GR" sz="2000" dirty="0"/>
-              <a:t>για διασαφηνίσουμε κάποιες έννοιες που αναφέρονταν στην εργασία.</a:t>
+              <a:rPr lang="el-GR" dirty="0"/>
+              <a:t>για διασαφήνιση   σχετικών  εννοιών  (</a:t>
+            </a:r>
+            <a:r>
+              <a:rPr lang="en-US" dirty="0"/>
+              <a:t>flow monitoring, internet models, etc</a:t>
+            </a:r>
+            <a:r>
+              <a:rPr lang="el-GR" dirty="0"/>
+              <a:t>.</a:t>
+            </a:r>
+            <a:r>
+              <a:rPr lang="en-US" dirty="0"/>
+              <a:t>)</a:t>
+            </a:r>
+            <a:r>
+              <a:rPr lang="el-GR" dirty="0"/>
+              <a:t> που αναφέρονταν στην εργασία.</a:t>
             </a:r>
             <a:br>
-              <a:rPr lang="en-US" sz="2000" dirty="0"/>
+              <a:rPr lang="en-US" dirty="0"/>
             </a:br>
-            <a:endParaRPr lang="el-GR" sz="2000" dirty="0"/>
+            <a:endParaRPr lang="el-GR" dirty="0"/>
           </a:p>
         </p:txBody>
       </p:sp>
@@ -22314,8 +22640,8 @@
         </p:blipFill>
         <p:spPr>
           <a:xfrm>
-            <a:off x="6708710" y="1924158"/>
-            <a:ext cx="5483290" cy="4956607"/>
+            <a:off x="7959007" y="2454009"/>
+            <a:ext cx="3797565" cy="3432800"/>
           </a:xfrm>
           <a:prstGeom prst="rect">
             <a:avLst/>
@@ -22343,7 +22669,288 @@
 </p:sld>
 </file>
 
-<file path=ppt/slides/slide5.xml><?xml version="1.0" encoding="utf-8"?>
+<file path=ppt/slides/slide6.xml><?xml version="1.0" encoding="utf-8"?>
+<p:sld xmlns:a="http://schemas.openxmlformats.org/drawingml/2006/main" xmlns:r="http://schemas.openxmlformats.org/officeDocument/2006/relationships" xmlns:p="http://schemas.openxmlformats.org/presentationml/2006/main">
+  <p:cSld>
+    <p:spTree>
+      <p:nvGrpSpPr>
+        <p:cNvPr id="1" name=""/>
+        <p:cNvGrpSpPr/>
+        <p:nvPr/>
+      </p:nvGrpSpPr>
+      <p:grpSpPr>
+        <a:xfrm>
+          <a:off x="0" y="0"/>
+          <a:ext cx="0" cy="0"/>
+          <a:chOff x="0" y="0"/>
+          <a:chExt cx="0" cy="0"/>
+        </a:xfrm>
+      </p:grpSpPr>
+      <p:sp>
+        <p:nvSpPr>
+          <p:cNvPr id="5" name="Τίτλος 1">
+            <a:extLst>
+              <a:ext uri="{FF2B5EF4-FFF2-40B4-BE49-F238E27FC236}">
+                <a16:creationId xmlns:a16="http://schemas.microsoft.com/office/drawing/2014/main" id="{FB84AE28-5848-E665-6D72-8FA26E4F4EA0}"/>
+              </a:ext>
+            </a:extLst>
+          </p:cNvPr>
+          <p:cNvSpPr txBox="1">
+            <a:spLocks/>
+          </p:cNvSpPr>
+          <p:nvPr/>
+        </p:nvSpPr>
+        <p:spPr>
+          <a:xfrm>
+            <a:off x="1045029" y="1074429"/>
+            <a:ext cx="9453318" cy="676733"/>
+          </a:xfrm>
+          <a:prstGeom prst="rect">
+            <a:avLst/>
+          </a:prstGeom>
+        </p:spPr>
+        <p:txBody>
+          <a:bodyPr vert="horz" lIns="91440" tIns="45720" rIns="91440" bIns="45720" rtlCol="0" anchor="ctr">
+            <a:noAutofit/>
+          </a:bodyPr>
+          <a:lstStyle>
+            <a:lvl1pPr algn="l" defTabSz="914400" rtl="0" eaLnBrk="1" latinLnBrk="0" hangingPunct="1">
+              <a:lnSpc>
+                <a:spcPct val="80000"/>
+              </a:lnSpc>
+              <a:spcBef>
+                <a:spcPct val="0"/>
+              </a:spcBef>
+              <a:buNone/>
+              <a:defRPr sz="5000" kern="1200" cap="all" spc="100" baseline="0">
+                <a:solidFill>
+                  <a:schemeClr val="tx1">
+                    <a:lumMod val="95000"/>
+                    <a:lumOff val="5000"/>
+                  </a:schemeClr>
+                </a:solidFill>
+                <a:latin typeface="Calibri" panose="020F0502020204030204" pitchFamily="34" charset="0"/>
+                <a:ea typeface="+mj-ea"/>
+                <a:cs typeface="+mj-cs"/>
+              </a:defRPr>
+            </a:lvl1pPr>
+          </a:lstStyle>
+          <a:p>
+            <a:r>
+              <a:rPr lang="el-GR" sz="4800" b="1" dirty="0"/>
+              <a:t>δεδομενΑ για το ερωτημα 1</a:t>
+            </a:r>
+            <a:br>
+              <a:rPr lang="el-GR" sz="4800" dirty="0"/>
+            </a:br>
+            <a:endParaRPr lang="el-GR" sz="4800" dirty="0"/>
+          </a:p>
+        </p:txBody>
+      </p:sp>
+      <p:sp>
+        <p:nvSpPr>
+          <p:cNvPr id="6" name="Θέση περιεχομένου 2">
+            <a:extLst>
+              <a:ext uri="{FF2B5EF4-FFF2-40B4-BE49-F238E27FC236}">
+                <a16:creationId xmlns:a16="http://schemas.microsoft.com/office/drawing/2014/main" id="{1BD6B2D5-E19E-AB53-1C03-C2A591F05B5B}"/>
+              </a:ext>
+            </a:extLst>
+          </p:cNvPr>
+          <p:cNvSpPr>
+            <a:spLocks noGrp="1"/>
+          </p:cNvSpPr>
+          <p:nvPr>
+            <p:ph idx="1"/>
+          </p:nvPr>
+        </p:nvSpPr>
+        <p:spPr>
+          <a:xfrm>
+            <a:off x="1045029" y="2155371"/>
+            <a:ext cx="10888824" cy="4198776"/>
+          </a:xfrm>
+        </p:spPr>
+        <p:txBody>
+          <a:bodyPr>
+            <a:normAutofit/>
+          </a:bodyPr>
+          <a:lstStyle/>
+          <a:p>
+            <a:pPr algn="just">
+              <a:buFont typeface="Arial" panose="020B0604020202020204" pitchFamily="34" charset="0"/>
+              <a:buChar char="•"/>
+            </a:pPr>
+            <a:r>
+              <a:rPr lang="en-US" dirty="0"/>
+              <a:t> </a:t>
+            </a:r>
+            <a:r>
+              <a:rPr lang="el-GR" dirty="0"/>
+              <a:t>Μέσα στον φάκελο</a:t>
+            </a:r>
+            <a:r>
+              <a:rPr lang="en-US" dirty="0"/>
+              <a:t> scratch </a:t>
+            </a:r>
+            <a:r>
+              <a:rPr lang="el-GR" dirty="0"/>
+              <a:t>του </a:t>
+            </a:r>
+            <a:r>
+              <a:rPr lang="en-US" dirty="0"/>
+              <a:t>NS3 </a:t>
+            </a:r>
+            <a:r>
+              <a:rPr lang="el-GR" dirty="0"/>
+              <a:t>υλοποιήθηκε η λύση του 1</a:t>
+            </a:r>
+            <a:r>
+              <a:rPr lang="el-GR" baseline="30000" dirty="0"/>
+              <a:t>ου</a:t>
+            </a:r>
+            <a:r>
+              <a:rPr lang="el-GR" dirty="0"/>
+              <a:t> ερωτήματος στο αρχείο </a:t>
+            </a:r>
+            <a:r>
+              <a:rPr lang="en-US" dirty="0"/>
+              <a:t>mypoint.cc</a:t>
+            </a:r>
+          </a:p>
+          <a:p>
+            <a:pPr algn="just">
+              <a:buFont typeface="Arial" panose="020B0604020202020204" pitchFamily="34" charset="0"/>
+              <a:buChar char="•"/>
+            </a:pPr>
+            <a:r>
+              <a:rPr lang="el-GR" dirty="0"/>
+              <a:t> Έγινε χρήση </a:t>
+            </a:r>
+            <a:r>
+              <a:rPr lang="en-US" dirty="0"/>
+              <a:t>C++</a:t>
+            </a:r>
+          </a:p>
+          <a:p>
+            <a:pPr algn="just">
+              <a:buFont typeface="Arial" panose="020B0604020202020204" pitchFamily="34" charset="0"/>
+              <a:buChar char="•"/>
+            </a:pPr>
+            <a:r>
+              <a:rPr lang="el-GR" dirty="0"/>
+              <a:t> Έγινε χρήση των  βιβλιοθηκών </a:t>
+            </a:r>
+            <a:r>
+              <a:rPr lang="en-US" dirty="0"/>
+              <a:t>:</a:t>
+            </a:r>
+            <a:r>
+              <a:rPr lang="el-GR" dirty="0"/>
+              <a:t> </a:t>
+            </a:r>
+            <a:r>
+              <a:rPr lang="en-US" dirty="0"/>
+              <a:t>flow- monitoring -</a:t>
+            </a:r>
+            <a:r>
+              <a:rPr lang="en-US" dirty="0" err="1"/>
+              <a:t>module.h</a:t>
+            </a:r>
+            <a:r>
+              <a:rPr lang="en-US" dirty="0"/>
+              <a:t> , point-to-point-</a:t>
+            </a:r>
+            <a:r>
+              <a:rPr lang="en-US" dirty="0" err="1"/>
+              <a:t>module.h</a:t>
+            </a:r>
+            <a:endParaRPr lang="en-US" dirty="0"/>
+          </a:p>
+          <a:p>
+            <a:pPr algn="just">
+              <a:buFont typeface="Arial" panose="020B0604020202020204" pitchFamily="34" charset="0"/>
+              <a:buChar char="•"/>
+            </a:pPr>
+            <a:r>
+              <a:rPr lang="el-GR" dirty="0"/>
+              <a:t> Έγινε παραμετροποίηση με τις παραδοχές </a:t>
+            </a:r>
+            <a:r>
+              <a:rPr lang="en-US" dirty="0"/>
+              <a:t>:</a:t>
+            </a:r>
+            <a:endParaRPr lang="el-GR" dirty="0"/>
+          </a:p>
+          <a:p>
+            <a:pPr marL="173736" lvl="1" indent="0" algn="just">
+              <a:buNone/>
+            </a:pPr>
+            <a:r>
+              <a:rPr lang="en-US" dirty="0"/>
+              <a:t>  Data Rate = 5Mbps</a:t>
+            </a:r>
+          </a:p>
+          <a:p>
+            <a:pPr marL="173736" lvl="1" indent="0" algn="just">
+              <a:buNone/>
+            </a:pPr>
+            <a:r>
+              <a:rPr lang="en-US" dirty="0"/>
+              <a:t>  Delay = 6ms</a:t>
+            </a:r>
+          </a:p>
+          <a:p>
+            <a:pPr marL="173736" lvl="1" indent="0" algn="just">
+              <a:buNone/>
+            </a:pPr>
+            <a:r>
+              <a:rPr lang="en-US" dirty="0"/>
+              <a:t>  Packet Size = 1024</a:t>
+            </a:r>
+          </a:p>
+          <a:p>
+            <a:pPr marL="173736" lvl="1" indent="0" algn="just">
+              <a:buNone/>
+            </a:pPr>
+            <a:r>
+              <a:rPr lang="en-US" dirty="0"/>
+              <a:t>  Max Packets = 6</a:t>
+            </a:r>
+          </a:p>
+          <a:p>
+            <a:pPr marL="173736" lvl="1" indent="0" algn="just">
+              <a:buNone/>
+            </a:pPr>
+            <a:r>
+              <a:rPr lang="en-US" dirty="0"/>
+              <a:t>  Simulation Time = 11.0</a:t>
+            </a:r>
+          </a:p>
+          <a:p>
+            <a:pPr algn="just">
+              <a:buFont typeface="Arial" panose="020B0604020202020204" pitchFamily="34" charset="0"/>
+              <a:buChar char="•"/>
+            </a:pPr>
+            <a:endParaRPr lang="el-GR" dirty="0"/>
+          </a:p>
+        </p:txBody>
+      </p:sp>
+    </p:spTree>
+    <p:extLst>
+      <p:ext uri="{BB962C8B-B14F-4D97-AF65-F5344CB8AC3E}">
+        <p14:creationId xmlns:p14="http://schemas.microsoft.com/office/powerpoint/2010/main" val="2973954065"/>
+      </p:ext>
+    </p:extLst>
+  </p:cSld>
+  <p:clrMapOvr>
+    <a:masterClrMapping/>
+  </p:clrMapOvr>
+  <p:transition spd="slow">
+    <p:push dir="u"/>
+  </p:transition>
+</p:sld>
+</file>
+
+<file path=ppt/slides/slide7.xml><?xml version="1.0" encoding="utf-8"?>
 <p:sld xmlns:a="http://schemas.openxmlformats.org/drawingml/2006/main" xmlns:r="http://schemas.openxmlformats.org/officeDocument/2006/relationships" xmlns:p="http://schemas.openxmlformats.org/presentationml/2006/main">
   <p:cSld>
     <p:spTree>
@@ -22378,24 +22985,24 @@
         </p:nvSpPr>
         <p:spPr>
           <a:xfrm>
-            <a:off x="1024128" y="585216"/>
-            <a:ext cx="9720072" cy="1499616"/>
+            <a:off x="1024127" y="979714"/>
+            <a:ext cx="10415203" cy="1105118"/>
           </a:xfrm>
         </p:spPr>
         <p:txBody>
           <a:bodyPr anchor="ctr">
-            <a:normAutofit/>
+            <a:noAutofit/>
           </a:bodyPr>
           <a:lstStyle/>
           <a:p>
             <a:r>
-              <a:rPr lang="el-GR" sz="3500" b="1" dirty="0"/>
-              <a:t>δεδομενΑ και αποτελεσματα του ερωτηματοσ 1</a:t>
+              <a:rPr lang="el-GR" sz="4800" b="1" dirty="0"/>
+              <a:t>αποτελεσματα του ερωτηματοσ 1</a:t>
             </a:r>
             <a:br>
-              <a:rPr lang="el-GR" sz="3500" dirty="0"/>
+              <a:rPr lang="el-GR" sz="4800" dirty="0"/>
             </a:br>
-            <a:endParaRPr lang="el-GR" sz="3500" dirty="0"/>
+            <a:endParaRPr lang="el-GR" sz="4800" dirty="0"/>
           </a:p>
         </p:txBody>
       </p:sp>
@@ -22417,7 +23024,7 @@
         </p:nvSpPr>
         <p:spPr>
           <a:xfrm>
-            <a:off x="1024127" y="2286000"/>
+            <a:off x="1024127" y="2579914"/>
             <a:ext cx="4754880" cy="1698171"/>
           </a:xfrm>
         </p:spPr>
@@ -22483,8 +23090,8 @@
         </p:blipFill>
         <p:spPr>
           <a:xfrm>
-            <a:off x="6764694" y="2286000"/>
-            <a:ext cx="3881535" cy="4023360"/>
+            <a:off x="6764694" y="2184449"/>
+            <a:ext cx="3979506" cy="4124911"/>
           </a:xfrm>
           <a:prstGeom prst="rect">
             <a:avLst/>
@@ -22508,7 +23115,7 @@
 </p:sld>
 </file>
 
-<file path=ppt/slides/slide6.xml><?xml version="1.0" encoding="utf-8"?>
+<file path=ppt/slides/slide8.xml><?xml version="1.0" encoding="utf-8"?>
 <p:sld xmlns:a="http://schemas.openxmlformats.org/drawingml/2006/main" xmlns:r="http://schemas.openxmlformats.org/officeDocument/2006/relationships" xmlns:p="http://schemas.openxmlformats.org/presentationml/2006/main">
   <p:cSld>
     <p:spTree>

</xml_diff>

<commit_message>
parousiasi gia to erotima ena kai dio
</commit_message>
<xml_diff>
--- a/Presentations/Ns-3_presentation_F.pptx
+++ b/Presentations/Ns-3_presentation_F.pptx
@@ -5,20 +5,25 @@
     <p:sldMasterId id="2147483648" r:id="rId4"/>
   </p:sldMasterIdLst>
   <p:notesMasterIdLst>
-    <p:notesMasterId r:id="rId13"/>
+    <p:notesMasterId r:id="rId18"/>
   </p:notesMasterIdLst>
   <p:handoutMasterIdLst>
-    <p:handoutMasterId r:id="rId14"/>
+    <p:handoutMasterId r:id="rId19"/>
   </p:handoutMasterIdLst>
   <p:sldIdLst>
     <p:sldId id="256" r:id="rId5"/>
     <p:sldId id="277" r:id="rId6"/>
     <p:sldId id="284" r:id="rId7"/>
-    <p:sldId id="279" r:id="rId8"/>
-    <p:sldId id="282" r:id="rId9"/>
-    <p:sldId id="283" r:id="rId10"/>
-    <p:sldId id="278" r:id="rId11"/>
-    <p:sldId id="281" r:id="rId12"/>
+    <p:sldId id="289" r:id="rId8"/>
+    <p:sldId id="279" r:id="rId9"/>
+    <p:sldId id="282" r:id="rId10"/>
+    <p:sldId id="283" r:id="rId11"/>
+    <p:sldId id="278" r:id="rId12"/>
+    <p:sldId id="287" r:id="rId13"/>
+    <p:sldId id="290" r:id="rId14"/>
+    <p:sldId id="286" r:id="rId15"/>
+    <p:sldId id="288" r:id="rId16"/>
+    <p:sldId id="281" r:id="rId17"/>
   </p:sldIdLst>
   <p:sldSz cx="12192000" cy="6858000"/>
   <p:notesSz cx="6858000" cy="9144000"/>
@@ -212,7 +217,7 @@
             <a:pPr rtl="0"/>
             <a:fld id="{F0EC7D35-77BB-4867-BAC6-5C40C37B98F1}" type="datetime1">
               <a:rPr lang="el-GR" smtClean="0"/>
-              <a:t>3/11/2025</a:t>
+              <a:t>4/11/2025</a:t>
             </a:fld>
             <a:endParaRPr lang="el-GR" dirty="0"/>
           </a:p>
@@ -382,7 +387,7 @@
             <a:pPr rtl="0"/>
             <a:fld id="{707ABAE7-72BE-4378-9C66-B300388DE536}" type="datetime1">
               <a:rPr lang="el-GR" noProof="0" smtClean="0"/>
-              <a:t>3/11/2025</a:t>
+              <a:t>4/11/2025</a:t>
             </a:fld>
             <a:endParaRPr lang="el-GR" noProof="0" dirty="0"/>
           </a:p>
@@ -9649,7 +9654,7 @@
             <a:pPr rtl="0"/>
             <a:fld id="{EABDBA74-E4DB-4313-95D3-B7F630EE7B7F}" type="datetime1">
               <a:rPr lang="el-GR" noProof="0" smtClean="0"/>
-              <a:t>3/11/2025</a:t>
+              <a:t>4/11/2025</a:t>
             </a:fld>
             <a:endParaRPr lang="el-GR" noProof="0" dirty="0"/>
           </a:p>
@@ -9858,7 +9863,7 @@
             <a:pPr rtl="0"/>
             <a:fld id="{D9C97E28-F60A-427B-851A-BCC048F06BC7}" type="datetime1">
               <a:rPr lang="el-GR" noProof="0" smtClean="0"/>
-              <a:t>3/11/2025</a:t>
+              <a:t>4/11/2025</a:t>
             </a:fld>
             <a:endParaRPr lang="el-GR" noProof="0" dirty="0"/>
           </a:p>
@@ -10040,7 +10045,7 @@
             <a:pPr rtl="0"/>
             <a:fld id="{4EA33EDB-81C3-4DAA-87EA-DA21D6A7FC6C}" type="datetime1">
               <a:rPr lang="el-GR" noProof="0" smtClean="0"/>
-              <a:t>3/11/2025</a:t>
+              <a:t>4/11/2025</a:t>
             </a:fld>
             <a:endParaRPr lang="el-GR" noProof="0" dirty="0"/>
           </a:p>
@@ -10247,7 +10252,7 @@
             <a:pPr rtl="0"/>
             <a:fld id="{0FE5ACA5-56F5-4208-8101-108DA68822C6}" type="datetime1">
               <a:rPr lang="el-GR" noProof="0" smtClean="0"/>
-              <a:t>3/11/2025</a:t>
+              <a:t>4/11/2025</a:t>
             </a:fld>
             <a:endParaRPr lang="el-GR" noProof="0" dirty="0"/>
           </a:p>
@@ -19161,7 +19166,7 @@
             <a:pPr rtl="0"/>
             <a:fld id="{98AAE694-814A-4F58-A8E2-AA9B6575E0B5}" type="datetime1">
               <a:rPr lang="el-GR" noProof="0" smtClean="0"/>
-              <a:t>3/11/2025</a:t>
+              <a:t>4/11/2025</a:t>
             </a:fld>
             <a:endParaRPr lang="el-GR" noProof="0" dirty="0"/>
           </a:p>
@@ -19437,7 +19442,7 @@
             <a:pPr rtl="0"/>
             <a:fld id="{98B30D4A-F623-45A5-BE49-543B4B609AF2}" type="datetime1">
               <a:rPr lang="el-GR" noProof="0" smtClean="0"/>
-              <a:t>3/11/2025</a:t>
+              <a:t>4/11/2025</a:t>
             </a:fld>
             <a:endParaRPr lang="el-GR" noProof="0" dirty="0"/>
           </a:p>
@@ -19837,7 +19842,7 @@
             <a:pPr rtl="0"/>
             <a:fld id="{06412F62-D18F-463A-9A7E-E4809AAD76E4}" type="datetime1">
               <a:rPr lang="el-GR" noProof="0" smtClean="0"/>
-              <a:t>3/11/2025</a:t>
+              <a:t>4/11/2025</a:t>
             </a:fld>
             <a:endParaRPr lang="el-GR" noProof="0" dirty="0"/>
           </a:p>
@@ -19957,7 +19962,7 @@
             <a:pPr rtl="0"/>
             <a:fld id="{D2009D47-CF8A-48CB-81B8-5988DBFADA28}" type="datetime1">
               <a:rPr lang="el-GR" noProof="0" smtClean="0"/>
-              <a:t>3/11/2025</a:t>
+              <a:t>4/11/2025</a:t>
             </a:fld>
             <a:endParaRPr lang="el-GR" noProof="0" dirty="0"/>
           </a:p>
@@ -20053,7 +20058,7 @@
             <a:pPr rtl="0"/>
             <a:fld id="{89B075A6-4B0E-489A-92E5-C2C81D969D11}" type="datetime1">
               <a:rPr lang="el-GR" noProof="0" smtClean="0"/>
-              <a:t>3/11/2025</a:t>
+              <a:t>4/11/2025</a:t>
             </a:fld>
             <a:endParaRPr lang="el-GR" noProof="0" dirty="0"/>
           </a:p>
@@ -20345,7 +20350,7 @@
             <a:pPr rtl="0"/>
             <a:fld id="{7C290451-C354-46E0-BBD8-0317D7A1384C}" type="datetime1">
               <a:rPr lang="el-GR" noProof="0" smtClean="0"/>
-              <a:t>3/11/2025</a:t>
+              <a:t>4/11/2025</a:t>
             </a:fld>
             <a:endParaRPr lang="el-GR" noProof="0" dirty="0"/>
           </a:p>
@@ -20628,7 +20633,7 @@
             <a:pPr rtl="0"/>
             <a:fld id="{05DAA40D-D363-46A0-9276-B6A4797DC9A5}" type="datetime1">
               <a:rPr lang="el-GR" noProof="0" smtClean="0"/>
-              <a:t>3/11/2025</a:t>
+              <a:t>4/11/2025</a:t>
             </a:fld>
             <a:endParaRPr lang="el-GR" noProof="0" dirty="0"/>
           </a:p>
@@ -20877,7 +20882,7 @@
           <a:p>
             <a:fld id="{F98FDC76-A1F5-4EE8-BDE3-5EFC56AAE7AD}" type="datetime1">
               <a:rPr lang="el-GR" noProof="0" smtClean="0"/>
-              <a:t>3/11/2025</a:t>
+              <a:t>4/11/2025</a:t>
             </a:fld>
             <a:endParaRPr lang="el-GR" noProof="0" dirty="0"/>
           </a:p>
@@ -21719,6 +21724,1396 @@
 </p:sld>
 </file>
 
+<file path=ppt/slides/slide10.xml><?xml version="1.0" encoding="utf-8"?>
+<p:sld xmlns:a="http://schemas.openxmlformats.org/drawingml/2006/main" xmlns:r="http://schemas.openxmlformats.org/officeDocument/2006/relationships" xmlns:p="http://schemas.openxmlformats.org/presentationml/2006/main">
+  <p:cSld>
+    <p:spTree>
+      <p:nvGrpSpPr>
+        <p:cNvPr id="1" name=""/>
+        <p:cNvGrpSpPr/>
+        <p:nvPr/>
+      </p:nvGrpSpPr>
+      <p:grpSpPr>
+        <a:xfrm>
+          <a:off x="0" y="0"/>
+          <a:ext cx="0" cy="0"/>
+          <a:chOff x="0" y="0"/>
+          <a:chExt cx="0" cy="0"/>
+        </a:xfrm>
+      </p:grpSpPr>
+      <p:sp>
+        <p:nvSpPr>
+          <p:cNvPr id="2" name="Τίτλος 1">
+            <a:extLst>
+              <a:ext uri="{FF2B5EF4-FFF2-40B4-BE49-F238E27FC236}">
+                <a16:creationId xmlns:a16="http://schemas.microsoft.com/office/drawing/2014/main" id="{1C8A6D00-8650-44C1-ADBF-B2BBD782652E}"/>
+              </a:ext>
+            </a:extLst>
+          </p:cNvPr>
+          <p:cNvSpPr>
+            <a:spLocks noGrp="1"/>
+          </p:cNvSpPr>
+          <p:nvPr>
+            <p:ph type="title"/>
+          </p:nvPr>
+        </p:nvSpPr>
+        <p:spPr/>
+        <p:txBody>
+          <a:bodyPr/>
+          <a:lstStyle/>
+          <a:p>
+            <a:r>
+              <a:rPr lang="el-GR" b="1" dirty="0"/>
+              <a:t>ΔΕΔΟΜΕΝΑ ΓΙΑ ΤΟ ΕΡΩΤΗΜΑ 2</a:t>
+            </a:r>
+            <a:r>
+              <a:rPr lang="en-US" b="1" dirty="0"/>
+              <a:t>(2)</a:t>
+            </a:r>
+            <a:endParaRPr lang="el-GR" dirty="0"/>
+          </a:p>
+        </p:txBody>
+      </p:sp>
+      <p:sp>
+        <p:nvSpPr>
+          <p:cNvPr id="4" name="Rectangle 1">
+            <a:extLst>
+              <a:ext uri="{FF2B5EF4-FFF2-40B4-BE49-F238E27FC236}">
+                <a16:creationId xmlns:a16="http://schemas.microsoft.com/office/drawing/2014/main" id="{D348DBDB-F5BE-4294-BA1E-2FB5A71F5C2C}"/>
+              </a:ext>
+            </a:extLst>
+          </p:cNvPr>
+          <p:cNvSpPr>
+            <a:spLocks noGrp="1" noChangeArrowheads="1"/>
+          </p:cNvSpPr>
+          <p:nvPr>
+            <p:ph idx="1"/>
+          </p:nvPr>
+        </p:nvSpPr>
+        <p:spPr bwMode="auto">
+          <a:xfrm>
+            <a:off x="1024128" y="2035525"/>
+            <a:ext cx="9136748" cy="4524315"/>
+          </a:xfrm>
+          <a:prstGeom prst="rect">
+            <a:avLst/>
+          </a:prstGeom>
+          <a:noFill/>
+          <a:ln>
+            <a:noFill/>
+          </a:ln>
+          <a:effectLst/>
+          <a:extLst>
+            <a:ext uri="{909E8E84-426E-40DD-AFC4-6F175D3DCCD1}">
+              <a14:hiddenFill xmlns:a14="http://schemas.microsoft.com/office/drawing/2010/main">
+                <a:solidFill>
+                  <a:schemeClr val="accent1"/>
+                </a:solidFill>
+              </a14:hiddenFill>
+            </a:ext>
+            <a:ext uri="{91240B29-F687-4F45-9708-019B960494DF}">
+              <a14:hiddenLine xmlns:a14="http://schemas.microsoft.com/office/drawing/2010/main" w="9525">
+                <a:solidFill>
+                  <a:schemeClr val="tx1"/>
+                </a:solidFill>
+                <a:miter lim="800000"/>
+                <a:headEnd/>
+                <a:tailEnd/>
+              </a14:hiddenLine>
+            </a:ext>
+            <a:ext uri="{AF507438-7753-43E0-B8FC-AC1667EBCBE1}">
+              <a14:hiddenEffects xmlns:a14="http://schemas.microsoft.com/office/drawing/2010/main">
+                <a:effectLst>
+                  <a:outerShdw dist="35921" dir="2700000" algn="ctr" rotWithShape="0">
+                    <a:schemeClr val="bg2"/>
+                  </a:outerShdw>
+                </a:effectLst>
+              </a14:hiddenEffects>
+            </a:ext>
+          </a:extLst>
+        </p:spPr>
+        <p:txBody>
+          <a:bodyPr vert="horz" wrap="square" lIns="91440" tIns="45720" rIns="91440" bIns="45720" numCol="1" anchor="ctr" anchorCtr="0" compatLnSpc="1">
+            <a:prstTxWarp prst="textNoShape">
+              <a:avLst/>
+            </a:prstTxWarp>
+            <a:spAutoFit/>
+          </a:bodyPr>
+          <a:lstStyle/>
+          <a:p>
+            <a:pPr marL="0" marR="0" lvl="0" indent="0" algn="l" defTabSz="914400" rtl="0" eaLnBrk="0" fontAlgn="base" latinLnBrk="0" hangingPunct="0">
+              <a:lnSpc>
+                <a:spcPct val="100000"/>
+              </a:lnSpc>
+              <a:spcBef>
+                <a:spcPct val="0"/>
+              </a:spcBef>
+              <a:spcAft>
+                <a:spcPct val="0"/>
+              </a:spcAft>
+              <a:buClrTx/>
+              <a:buSzTx/>
+              <a:buNone/>
+              <a:tabLst/>
+            </a:pPr>
+            <a:endParaRPr kumimoji="0" lang="en-US" altLang="el-GR" sz="1800" b="1" i="0" u="none" strike="noStrike" cap="none" normalizeH="0" baseline="0" dirty="0">
+              <a:ln>
+                <a:noFill/>
+              </a:ln>
+              <a:solidFill>
+                <a:schemeClr val="tx1"/>
+              </a:solidFill>
+              <a:effectLst/>
+              <a:latin typeface="Arial" panose="020B0604020202020204" pitchFamily="34" charset="0"/>
+            </a:endParaRPr>
+          </a:p>
+          <a:p>
+            <a:pPr marL="0" marR="0" lvl="0" indent="0" algn="l" defTabSz="914400" rtl="0" eaLnBrk="0" fontAlgn="base" latinLnBrk="0" hangingPunct="0">
+              <a:lnSpc>
+                <a:spcPct val="100000"/>
+              </a:lnSpc>
+              <a:spcBef>
+                <a:spcPct val="0"/>
+              </a:spcBef>
+              <a:spcAft>
+                <a:spcPct val="0"/>
+              </a:spcAft>
+              <a:buClrTx/>
+              <a:buSzTx/>
+              <a:buNone/>
+              <a:tabLst/>
+            </a:pPr>
+            <a:r>
+              <a:rPr lang="el-GR" altLang="el-GR" sz="1800" b="1" dirty="0">
+                <a:latin typeface="Arial" panose="020B0604020202020204" pitchFamily="34" charset="0"/>
+              </a:rPr>
+              <a:t>Για την δυναμική δρομολόγηση</a:t>
+            </a:r>
+            <a:r>
+              <a:rPr lang="en-US" altLang="el-GR" sz="1800" b="1" dirty="0">
+                <a:latin typeface="Arial" panose="020B0604020202020204" pitchFamily="34" charset="0"/>
+              </a:rPr>
+              <a:t>:</a:t>
+            </a:r>
+            <a:endParaRPr lang="el-GR" altLang="el-GR" sz="1800" b="1" dirty="0">
+              <a:latin typeface="Arial" panose="020B0604020202020204" pitchFamily="34" charset="0"/>
+            </a:endParaRPr>
+          </a:p>
+          <a:p>
+            <a:pPr marL="0" marR="0" lvl="0" indent="0" algn="l" defTabSz="914400" rtl="0" eaLnBrk="0" fontAlgn="base" latinLnBrk="0" hangingPunct="0">
+              <a:lnSpc>
+                <a:spcPct val="100000"/>
+              </a:lnSpc>
+              <a:spcBef>
+                <a:spcPct val="0"/>
+              </a:spcBef>
+              <a:spcAft>
+                <a:spcPct val="0"/>
+              </a:spcAft>
+              <a:buClrTx/>
+              <a:buSzTx/>
+              <a:buNone/>
+              <a:tabLst/>
+            </a:pPr>
+            <a:r>
+              <a:rPr kumimoji="0" lang="el-GR" altLang="el-GR" sz="1800" b="1" i="0" u="none" strike="noStrike" cap="none" normalizeH="0" baseline="0" dirty="0">
+                <a:ln>
+                  <a:noFill/>
+                </a:ln>
+                <a:solidFill>
+                  <a:schemeClr val="tx1"/>
+                </a:solidFill>
+                <a:effectLst/>
+                <a:latin typeface="Arial" panose="020B0604020202020204" pitchFamily="34" charset="0"/>
+              </a:rPr>
+              <a:t>Common </a:t>
+            </a:r>
+            <a:r>
+              <a:rPr kumimoji="0" lang="el-GR" altLang="el-GR" sz="1800" b="1" i="0" u="none" strike="noStrike" cap="none" normalizeH="0" baseline="0" dirty="0" err="1">
+                <a:ln>
+                  <a:noFill/>
+                </a:ln>
+                <a:solidFill>
+                  <a:schemeClr val="tx1"/>
+                </a:solidFill>
+                <a:effectLst/>
+                <a:latin typeface="Arial" panose="020B0604020202020204" pitchFamily="34" charset="0"/>
+              </a:rPr>
+              <a:t>Protocols</a:t>
+            </a:r>
+            <a:r>
+              <a:rPr kumimoji="0" lang="el-GR" altLang="el-GR" sz="1800" b="0" i="0" u="none" strike="noStrike" cap="none" normalizeH="0" baseline="0" dirty="0">
+                <a:ln>
+                  <a:noFill/>
+                </a:ln>
+                <a:solidFill>
+                  <a:schemeClr val="tx1"/>
+                </a:solidFill>
+                <a:effectLst/>
+                <a:latin typeface="Arial" panose="020B0604020202020204" pitchFamily="34" charset="0"/>
+              </a:rPr>
+              <a:t>:</a:t>
+            </a:r>
+          </a:p>
+          <a:p>
+            <a:pPr marL="0" marR="0" lvl="0" indent="0" algn="l" defTabSz="914400" rtl="0" eaLnBrk="0" fontAlgn="base" latinLnBrk="0" hangingPunct="0">
+              <a:lnSpc>
+                <a:spcPct val="100000"/>
+              </a:lnSpc>
+              <a:spcBef>
+                <a:spcPct val="0"/>
+              </a:spcBef>
+              <a:spcAft>
+                <a:spcPct val="0"/>
+              </a:spcAft>
+              <a:buClrTx/>
+              <a:buSzTx/>
+              <a:buFontTx/>
+              <a:buChar char="•"/>
+              <a:tabLst/>
+            </a:pPr>
+            <a:r>
+              <a:rPr kumimoji="0" lang="el-GR" altLang="el-GR" sz="1800" b="0" i="0" u="none" strike="noStrike" cap="none" normalizeH="0" baseline="0" dirty="0">
+                <a:ln>
+                  <a:noFill/>
+                </a:ln>
+                <a:solidFill>
+                  <a:schemeClr val="tx1"/>
+                </a:solidFill>
+                <a:effectLst/>
+                <a:latin typeface="Arial" panose="020B0604020202020204" pitchFamily="34" charset="0"/>
+              </a:rPr>
+              <a:t>AODV (Ad-hoc On-</a:t>
+            </a:r>
+            <a:r>
+              <a:rPr kumimoji="0" lang="el-GR" altLang="el-GR" sz="1800" b="0" i="0" u="none" strike="noStrike" cap="none" normalizeH="0" baseline="0" dirty="0" err="1">
+                <a:ln>
+                  <a:noFill/>
+                </a:ln>
+                <a:solidFill>
+                  <a:schemeClr val="tx1"/>
+                </a:solidFill>
+                <a:effectLst/>
+                <a:latin typeface="Arial" panose="020B0604020202020204" pitchFamily="34" charset="0"/>
+              </a:rPr>
+              <a:t>demand</a:t>
+            </a:r>
+            <a:r>
+              <a:rPr kumimoji="0" lang="el-GR" altLang="el-GR" sz="1800" b="0" i="0" u="none" strike="noStrike" cap="none" normalizeH="0" baseline="0" dirty="0">
+                <a:ln>
+                  <a:noFill/>
+                </a:ln>
+                <a:solidFill>
+                  <a:schemeClr val="tx1"/>
+                </a:solidFill>
+                <a:effectLst/>
+                <a:latin typeface="Arial" panose="020B0604020202020204" pitchFamily="34" charset="0"/>
+              </a:rPr>
+              <a:t> </a:t>
+            </a:r>
+            <a:r>
+              <a:rPr kumimoji="0" lang="el-GR" altLang="el-GR" sz="1800" b="0" i="0" u="none" strike="noStrike" cap="none" normalizeH="0" baseline="0" dirty="0" err="1">
+                <a:ln>
+                  <a:noFill/>
+                </a:ln>
+                <a:solidFill>
+                  <a:schemeClr val="tx1"/>
+                </a:solidFill>
+                <a:effectLst/>
+                <a:latin typeface="Arial" panose="020B0604020202020204" pitchFamily="34" charset="0"/>
+              </a:rPr>
+              <a:t>Distance</a:t>
+            </a:r>
+            <a:r>
+              <a:rPr kumimoji="0" lang="el-GR" altLang="el-GR" sz="1800" b="0" i="0" u="none" strike="noStrike" cap="none" normalizeH="0" baseline="0" dirty="0">
+                <a:ln>
+                  <a:noFill/>
+                </a:ln>
+                <a:solidFill>
+                  <a:schemeClr val="tx1"/>
+                </a:solidFill>
+                <a:effectLst/>
+                <a:latin typeface="Arial" panose="020B0604020202020204" pitchFamily="34" charset="0"/>
+              </a:rPr>
+              <a:t> </a:t>
+            </a:r>
+            <a:r>
+              <a:rPr kumimoji="0" lang="el-GR" altLang="el-GR" sz="1800" b="0" i="0" u="none" strike="noStrike" cap="none" normalizeH="0" baseline="0" dirty="0" err="1">
+                <a:ln>
+                  <a:noFill/>
+                </a:ln>
+                <a:solidFill>
+                  <a:schemeClr val="tx1"/>
+                </a:solidFill>
+                <a:effectLst/>
+                <a:latin typeface="Arial" panose="020B0604020202020204" pitchFamily="34" charset="0"/>
+              </a:rPr>
+              <a:t>Vector</a:t>
+            </a:r>
+            <a:r>
+              <a:rPr kumimoji="0" lang="el-GR" altLang="el-GR" sz="1800" b="0" i="0" u="none" strike="noStrike" cap="none" normalizeH="0" baseline="0" dirty="0">
+                <a:ln>
+                  <a:noFill/>
+                </a:ln>
+                <a:solidFill>
+                  <a:schemeClr val="tx1"/>
+                </a:solidFill>
+                <a:effectLst/>
+                <a:latin typeface="Arial" panose="020B0604020202020204" pitchFamily="34" charset="0"/>
+              </a:rPr>
+              <a:t>) </a:t>
+            </a:r>
+          </a:p>
+          <a:p>
+            <a:pPr marL="0" marR="0" lvl="0" indent="0" algn="l" defTabSz="914400" rtl="0" eaLnBrk="0" fontAlgn="base" latinLnBrk="0" hangingPunct="0">
+              <a:lnSpc>
+                <a:spcPct val="100000"/>
+              </a:lnSpc>
+              <a:spcBef>
+                <a:spcPct val="0"/>
+              </a:spcBef>
+              <a:spcAft>
+                <a:spcPct val="0"/>
+              </a:spcAft>
+              <a:buClrTx/>
+              <a:buSzTx/>
+              <a:buFontTx/>
+              <a:buChar char="•"/>
+              <a:tabLst/>
+            </a:pPr>
+            <a:r>
+              <a:rPr kumimoji="0" lang="el-GR" altLang="el-GR" sz="1800" b="0" i="0" u="none" strike="noStrike" cap="none" normalizeH="0" baseline="0" dirty="0">
+                <a:ln>
+                  <a:noFill/>
+                </a:ln>
+                <a:solidFill>
+                  <a:schemeClr val="tx1"/>
+                </a:solidFill>
+                <a:effectLst/>
+                <a:latin typeface="Arial" panose="020B0604020202020204" pitchFamily="34" charset="0"/>
+              </a:rPr>
+              <a:t>OLSR (</a:t>
+            </a:r>
+            <a:r>
+              <a:rPr kumimoji="0" lang="el-GR" altLang="el-GR" sz="1800" b="0" i="0" u="none" strike="noStrike" cap="none" normalizeH="0" baseline="0" dirty="0" err="1">
+                <a:ln>
+                  <a:noFill/>
+                </a:ln>
+                <a:solidFill>
+                  <a:schemeClr val="tx1"/>
+                </a:solidFill>
+                <a:effectLst/>
+                <a:latin typeface="Arial" panose="020B0604020202020204" pitchFamily="34" charset="0"/>
+              </a:rPr>
+              <a:t>Optimized</a:t>
+            </a:r>
+            <a:r>
+              <a:rPr kumimoji="0" lang="el-GR" altLang="el-GR" sz="1800" b="0" i="0" u="none" strike="noStrike" cap="none" normalizeH="0" baseline="0" dirty="0">
+                <a:ln>
+                  <a:noFill/>
+                </a:ln>
+                <a:solidFill>
+                  <a:schemeClr val="tx1"/>
+                </a:solidFill>
+                <a:effectLst/>
+                <a:latin typeface="Arial" panose="020B0604020202020204" pitchFamily="34" charset="0"/>
+              </a:rPr>
+              <a:t> </a:t>
+            </a:r>
+            <a:r>
+              <a:rPr kumimoji="0" lang="el-GR" altLang="el-GR" sz="1800" b="0" i="0" u="none" strike="noStrike" cap="none" normalizeH="0" baseline="0" dirty="0" err="1">
+                <a:ln>
+                  <a:noFill/>
+                </a:ln>
+                <a:solidFill>
+                  <a:schemeClr val="tx1"/>
+                </a:solidFill>
+                <a:effectLst/>
+                <a:latin typeface="Arial" panose="020B0604020202020204" pitchFamily="34" charset="0"/>
+              </a:rPr>
+              <a:t>Link</a:t>
+            </a:r>
+            <a:r>
+              <a:rPr kumimoji="0" lang="el-GR" altLang="el-GR" sz="1800" b="0" i="0" u="none" strike="noStrike" cap="none" normalizeH="0" baseline="0" dirty="0">
+                <a:ln>
+                  <a:noFill/>
+                </a:ln>
+                <a:solidFill>
+                  <a:schemeClr val="tx1"/>
+                </a:solidFill>
+                <a:effectLst/>
+                <a:latin typeface="Arial" panose="020B0604020202020204" pitchFamily="34" charset="0"/>
+              </a:rPr>
+              <a:t> </a:t>
+            </a:r>
+            <a:r>
+              <a:rPr kumimoji="0" lang="el-GR" altLang="el-GR" sz="1800" b="0" i="0" u="none" strike="noStrike" cap="none" normalizeH="0" baseline="0" dirty="0" err="1">
+                <a:ln>
+                  <a:noFill/>
+                </a:ln>
+                <a:solidFill>
+                  <a:schemeClr val="tx1"/>
+                </a:solidFill>
+                <a:effectLst/>
+                <a:latin typeface="Arial" panose="020B0604020202020204" pitchFamily="34" charset="0"/>
+              </a:rPr>
+              <a:t>State</a:t>
+            </a:r>
+            <a:r>
+              <a:rPr kumimoji="0" lang="el-GR" altLang="el-GR" sz="1800" b="0" i="0" u="none" strike="noStrike" cap="none" normalizeH="0" baseline="0" dirty="0">
+                <a:ln>
+                  <a:noFill/>
+                </a:ln>
+                <a:solidFill>
+                  <a:schemeClr val="tx1"/>
+                </a:solidFill>
+                <a:effectLst/>
+                <a:latin typeface="Arial" panose="020B0604020202020204" pitchFamily="34" charset="0"/>
+              </a:rPr>
+              <a:t> </a:t>
+            </a:r>
+            <a:r>
+              <a:rPr kumimoji="0" lang="el-GR" altLang="el-GR" sz="1800" b="0" i="0" u="none" strike="noStrike" cap="none" normalizeH="0" baseline="0" dirty="0" err="1">
+                <a:ln>
+                  <a:noFill/>
+                </a:ln>
+                <a:solidFill>
+                  <a:schemeClr val="tx1"/>
+                </a:solidFill>
+                <a:effectLst/>
+                <a:latin typeface="Arial" panose="020B0604020202020204" pitchFamily="34" charset="0"/>
+              </a:rPr>
+              <a:t>Routing</a:t>
+            </a:r>
+            <a:r>
+              <a:rPr kumimoji="0" lang="el-GR" altLang="el-GR" sz="1800" b="0" i="0" u="none" strike="noStrike" cap="none" normalizeH="0" baseline="0" dirty="0">
+                <a:ln>
+                  <a:noFill/>
+                </a:ln>
+                <a:solidFill>
+                  <a:schemeClr val="tx1"/>
+                </a:solidFill>
+                <a:effectLst/>
+                <a:latin typeface="Arial" panose="020B0604020202020204" pitchFamily="34" charset="0"/>
+              </a:rPr>
+              <a:t>)</a:t>
+            </a:r>
+            <a:endParaRPr kumimoji="0" lang="en-US" altLang="el-GR" sz="1800" b="0" i="0" u="none" strike="noStrike" cap="none" normalizeH="0" baseline="0" dirty="0">
+              <a:ln>
+                <a:noFill/>
+              </a:ln>
+              <a:solidFill>
+                <a:schemeClr val="tx1"/>
+              </a:solidFill>
+              <a:effectLst/>
+              <a:latin typeface="Arial" panose="020B0604020202020204" pitchFamily="34" charset="0"/>
+            </a:endParaRPr>
+          </a:p>
+          <a:p>
+            <a:pPr marL="0" marR="0" lvl="0" indent="0" algn="l" defTabSz="914400" rtl="0" eaLnBrk="0" fontAlgn="base" latinLnBrk="0" hangingPunct="0">
+              <a:lnSpc>
+                <a:spcPct val="100000"/>
+              </a:lnSpc>
+              <a:spcBef>
+                <a:spcPct val="0"/>
+              </a:spcBef>
+              <a:spcAft>
+                <a:spcPct val="0"/>
+              </a:spcAft>
+              <a:buClrTx/>
+              <a:buSzTx/>
+              <a:buFontTx/>
+              <a:buChar char="•"/>
+              <a:tabLst/>
+            </a:pPr>
+            <a:endParaRPr lang="en-US" altLang="el-GR" sz="1800" dirty="0">
+              <a:latin typeface="Arial" panose="020B0604020202020204" pitchFamily="34" charset="0"/>
+            </a:endParaRPr>
+          </a:p>
+          <a:p>
+            <a:pPr marL="0" lvl="0" indent="0" eaLnBrk="0" fontAlgn="base" hangingPunct="0">
+              <a:lnSpc>
+                <a:spcPct val="100000"/>
+              </a:lnSpc>
+              <a:spcBef>
+                <a:spcPct val="0"/>
+              </a:spcBef>
+              <a:spcAft>
+                <a:spcPct val="0"/>
+              </a:spcAft>
+              <a:buClrTx/>
+              <a:buSzTx/>
+              <a:buFontTx/>
+              <a:buChar char="•"/>
+            </a:pPr>
+            <a:endParaRPr lang="en-US" altLang="el-GR" sz="1800" dirty="0">
+              <a:latin typeface="Arial" panose="020B0604020202020204" pitchFamily="34" charset="0"/>
+            </a:endParaRPr>
+          </a:p>
+          <a:p>
+            <a:pPr marL="0" lvl="0" indent="0" eaLnBrk="0" fontAlgn="base" hangingPunct="0">
+              <a:lnSpc>
+                <a:spcPct val="100000"/>
+              </a:lnSpc>
+              <a:spcBef>
+                <a:spcPct val="0"/>
+              </a:spcBef>
+              <a:spcAft>
+                <a:spcPct val="0"/>
+              </a:spcAft>
+              <a:buClrTx/>
+              <a:buSzTx/>
+              <a:buNone/>
+            </a:pPr>
+            <a:r>
+              <a:rPr lang="el-GR" altLang="el-GR" sz="1800" dirty="0">
+                <a:latin typeface="Arial" panose="020B0604020202020204" pitchFamily="34" charset="0"/>
+              </a:rPr>
+              <a:t>Αποτυχία Σύνδεσης</a:t>
+            </a:r>
+            <a:r>
+              <a:rPr lang="en-US" altLang="el-GR" sz="1800" dirty="0">
+                <a:latin typeface="Arial" panose="020B0604020202020204" pitchFamily="34" charset="0"/>
+              </a:rPr>
+              <a:t>:</a:t>
+            </a:r>
+          </a:p>
+          <a:p>
+            <a:pPr marL="0" lvl="0" indent="0" eaLnBrk="0" fontAlgn="base" hangingPunct="0">
+              <a:lnSpc>
+                <a:spcPct val="100000"/>
+              </a:lnSpc>
+              <a:spcBef>
+                <a:spcPct val="0"/>
+              </a:spcBef>
+              <a:spcAft>
+                <a:spcPct val="0"/>
+              </a:spcAft>
+              <a:buClrTx/>
+              <a:buSzTx/>
+              <a:buFontTx/>
+              <a:buChar char="•"/>
+            </a:pPr>
+            <a:r>
+              <a:rPr lang="en-US" altLang="el-GR" sz="1800" dirty="0">
+                <a:latin typeface="Arial" panose="020B0604020202020204" pitchFamily="34" charset="0"/>
+              </a:rPr>
+              <a:t>    Establish a failure through inactive a connection or during the replicate a node.</a:t>
+            </a:r>
+          </a:p>
+          <a:p>
+            <a:pPr marL="0" lvl="0" indent="0" eaLnBrk="0" fontAlgn="base" hangingPunct="0">
+              <a:lnSpc>
+                <a:spcPct val="100000"/>
+              </a:lnSpc>
+              <a:spcBef>
+                <a:spcPct val="0"/>
+              </a:spcBef>
+              <a:spcAft>
+                <a:spcPct val="0"/>
+              </a:spcAft>
+              <a:buClrTx/>
+              <a:buSzTx/>
+              <a:buFontTx/>
+              <a:buChar char="•"/>
+            </a:pPr>
+            <a:r>
+              <a:rPr lang="en-US" altLang="el-GR" sz="1800" dirty="0">
+                <a:latin typeface="Arial" panose="020B0604020202020204" pitchFamily="34" charset="0"/>
+              </a:rPr>
+              <a:t>        Example: Inactivate a point-to-point connection:</a:t>
+            </a:r>
+          </a:p>
+          <a:p>
+            <a:pPr marL="0" lvl="0" indent="0" eaLnBrk="0" fontAlgn="base" hangingPunct="0">
+              <a:lnSpc>
+                <a:spcPct val="100000"/>
+              </a:lnSpc>
+              <a:spcBef>
+                <a:spcPct val="0"/>
+              </a:spcBef>
+              <a:spcAft>
+                <a:spcPct val="0"/>
+              </a:spcAft>
+              <a:buClrTx/>
+              <a:buSzTx/>
+              <a:buFontTx/>
+              <a:buChar char="•"/>
+            </a:pPr>
+            <a:endParaRPr lang="en-US" altLang="el-GR" sz="1800" dirty="0">
+              <a:latin typeface="Arial" panose="020B0604020202020204" pitchFamily="34" charset="0"/>
+            </a:endParaRPr>
+          </a:p>
+          <a:p>
+            <a:pPr marL="0" lvl="0" indent="0" eaLnBrk="0" fontAlgn="base" hangingPunct="0">
+              <a:lnSpc>
+                <a:spcPct val="100000"/>
+              </a:lnSpc>
+              <a:spcBef>
+                <a:spcPct val="0"/>
+              </a:spcBef>
+              <a:spcAft>
+                <a:spcPct val="0"/>
+              </a:spcAft>
+              <a:buClrTx/>
+              <a:buSzTx/>
+              <a:buFontTx/>
+              <a:buChar char="•"/>
+            </a:pPr>
+            <a:r>
+              <a:rPr lang="en-US" altLang="el-GR" sz="1800" dirty="0" err="1">
+                <a:latin typeface="Arial" panose="020B0604020202020204" pitchFamily="34" charset="0"/>
+              </a:rPr>
+              <a:t>Ptr</a:t>
+            </a:r>
+            <a:r>
+              <a:rPr lang="en-US" altLang="el-GR" sz="1800" dirty="0">
+                <a:latin typeface="Arial" panose="020B0604020202020204" pitchFamily="34" charset="0"/>
+              </a:rPr>
+              <a:t>&lt;Node&gt; node1 = </a:t>
+            </a:r>
+            <a:r>
+              <a:rPr lang="en-US" altLang="el-GR" sz="1800" dirty="0" err="1">
+                <a:latin typeface="Arial" panose="020B0604020202020204" pitchFamily="34" charset="0"/>
+              </a:rPr>
+              <a:t>nodes.Get</a:t>
+            </a:r>
+            <a:r>
+              <a:rPr lang="en-US" altLang="el-GR" sz="1800" dirty="0">
+                <a:latin typeface="Arial" panose="020B0604020202020204" pitchFamily="34" charset="0"/>
+              </a:rPr>
+              <a:t>(0);</a:t>
+            </a:r>
+          </a:p>
+          <a:p>
+            <a:pPr marL="0" marR="0" lvl="0" indent="0" algn="l" defTabSz="914400" rtl="0" eaLnBrk="0" fontAlgn="base" latinLnBrk="0" hangingPunct="0">
+              <a:lnSpc>
+                <a:spcPct val="100000"/>
+              </a:lnSpc>
+              <a:spcBef>
+                <a:spcPct val="0"/>
+              </a:spcBef>
+              <a:spcAft>
+                <a:spcPct val="0"/>
+              </a:spcAft>
+              <a:buClrTx/>
+              <a:buSzTx/>
+              <a:buFontTx/>
+              <a:buChar char="•"/>
+              <a:tabLst/>
+            </a:pPr>
+            <a:endParaRPr lang="en-US" altLang="el-GR" sz="1800" dirty="0">
+              <a:latin typeface="Arial" panose="020B0604020202020204" pitchFamily="34" charset="0"/>
+            </a:endParaRPr>
+          </a:p>
+          <a:p>
+            <a:pPr marL="0" marR="0" lvl="0" indent="0" algn="l" defTabSz="914400" rtl="0" eaLnBrk="0" fontAlgn="base" latinLnBrk="0" hangingPunct="0">
+              <a:lnSpc>
+                <a:spcPct val="100000"/>
+              </a:lnSpc>
+              <a:spcBef>
+                <a:spcPct val="0"/>
+              </a:spcBef>
+              <a:spcAft>
+                <a:spcPct val="0"/>
+              </a:spcAft>
+              <a:buClrTx/>
+              <a:buSzTx/>
+              <a:buNone/>
+              <a:tabLst/>
+            </a:pPr>
+            <a:endParaRPr kumimoji="0" lang="en-US" altLang="el-GR" sz="1800" b="0" i="0" u="none" strike="noStrike" cap="none" normalizeH="0" baseline="0" dirty="0">
+              <a:ln>
+                <a:noFill/>
+              </a:ln>
+              <a:solidFill>
+                <a:schemeClr val="tx1"/>
+              </a:solidFill>
+              <a:effectLst/>
+              <a:latin typeface="Arial" panose="020B0604020202020204" pitchFamily="34" charset="0"/>
+            </a:endParaRPr>
+          </a:p>
+          <a:p>
+            <a:pPr marL="0" marR="0" lvl="0" indent="0" algn="l" defTabSz="914400" rtl="0" eaLnBrk="0" fontAlgn="base" latinLnBrk="0" hangingPunct="0">
+              <a:lnSpc>
+                <a:spcPct val="100000"/>
+              </a:lnSpc>
+              <a:spcBef>
+                <a:spcPct val="0"/>
+              </a:spcBef>
+              <a:spcAft>
+                <a:spcPct val="0"/>
+              </a:spcAft>
+              <a:buClrTx/>
+              <a:buSzTx/>
+              <a:buNone/>
+              <a:tabLst/>
+            </a:pPr>
+            <a:endParaRPr kumimoji="0" lang="el-GR" altLang="el-GR" sz="1800" b="0" i="0" u="none" strike="noStrike" cap="none" normalizeH="0" baseline="0" dirty="0">
+              <a:ln>
+                <a:noFill/>
+              </a:ln>
+              <a:solidFill>
+                <a:schemeClr val="tx1"/>
+              </a:solidFill>
+              <a:effectLst/>
+              <a:latin typeface="Arial" panose="020B0604020202020204" pitchFamily="34" charset="0"/>
+            </a:endParaRPr>
+          </a:p>
+          <a:p>
+            <a:pPr marL="0" marR="0" lvl="0" indent="0" algn="l" defTabSz="914400" rtl="0" eaLnBrk="0" fontAlgn="base" latinLnBrk="0" hangingPunct="0">
+              <a:lnSpc>
+                <a:spcPct val="100000"/>
+              </a:lnSpc>
+              <a:spcBef>
+                <a:spcPct val="0"/>
+              </a:spcBef>
+              <a:spcAft>
+                <a:spcPct val="0"/>
+              </a:spcAft>
+              <a:buClrTx/>
+              <a:buSzTx/>
+              <a:buFontTx/>
+              <a:buNone/>
+              <a:tabLst/>
+            </a:pPr>
+            <a:endParaRPr kumimoji="0" lang="el-GR" altLang="el-GR" sz="1800" b="0" i="0" u="none" strike="noStrike" cap="none" normalizeH="0" baseline="0" dirty="0">
+              <a:ln>
+                <a:noFill/>
+              </a:ln>
+              <a:solidFill>
+                <a:schemeClr val="tx1"/>
+              </a:solidFill>
+              <a:effectLst/>
+              <a:latin typeface="Arial" panose="020B0604020202020204" pitchFamily="34" charset="0"/>
+            </a:endParaRPr>
+          </a:p>
+        </p:txBody>
+      </p:sp>
+    </p:spTree>
+    <p:extLst>
+      <p:ext uri="{BB962C8B-B14F-4D97-AF65-F5344CB8AC3E}">
+        <p14:creationId xmlns:p14="http://schemas.microsoft.com/office/powerpoint/2010/main" val="2607584059"/>
+      </p:ext>
+    </p:extLst>
+  </p:cSld>
+  <p:clrMapOvr>
+    <a:masterClrMapping/>
+  </p:clrMapOvr>
+  <p:transition spd="slow">
+    <p:push dir="u"/>
+  </p:transition>
+</p:sld>
+</file>
+
+<file path=ppt/slides/slide11.xml><?xml version="1.0" encoding="utf-8"?>
+<p:sld xmlns:a="http://schemas.openxmlformats.org/drawingml/2006/main" xmlns:r="http://schemas.openxmlformats.org/officeDocument/2006/relationships" xmlns:p="http://schemas.openxmlformats.org/presentationml/2006/main">
+  <p:cSld>
+    <p:spTree>
+      <p:nvGrpSpPr>
+        <p:cNvPr id="1" name=""/>
+        <p:cNvGrpSpPr/>
+        <p:nvPr/>
+      </p:nvGrpSpPr>
+      <p:grpSpPr>
+        <a:xfrm>
+          <a:off x="0" y="0"/>
+          <a:ext cx="0" cy="0"/>
+          <a:chOff x="0" y="0"/>
+          <a:chExt cx="0" cy="0"/>
+        </a:xfrm>
+      </p:grpSpPr>
+      <p:sp>
+        <p:nvSpPr>
+          <p:cNvPr id="2" name="Τίτλος 1">
+            <a:extLst>
+              <a:ext uri="{FF2B5EF4-FFF2-40B4-BE49-F238E27FC236}">
+                <a16:creationId xmlns:a16="http://schemas.microsoft.com/office/drawing/2014/main" id="{E5365960-9D8F-4319-A962-7839A7D1F5FE}"/>
+              </a:ext>
+            </a:extLst>
+          </p:cNvPr>
+          <p:cNvSpPr>
+            <a:spLocks noGrp="1"/>
+          </p:cNvSpPr>
+          <p:nvPr>
+            <p:ph type="title"/>
+          </p:nvPr>
+        </p:nvSpPr>
+        <p:spPr>
+          <a:xfrm>
+            <a:off x="1024128" y="585216"/>
+            <a:ext cx="9720072" cy="1495832"/>
+          </a:xfrm>
+        </p:spPr>
+        <p:txBody>
+          <a:bodyPr/>
+          <a:lstStyle/>
+          <a:p>
+            <a:r>
+              <a:rPr lang="el-GR" b="1" dirty="0"/>
+              <a:t>ΑΠΟΤΕΛΕΣΜΑΤΑ ΤΟΥ ΕΡΩΤΗΜΑΤΟΣ 2</a:t>
+            </a:r>
+          </a:p>
+        </p:txBody>
+      </p:sp>
+      <p:sp>
+        <p:nvSpPr>
+          <p:cNvPr id="3" name="Θέση περιεχομένου 2">
+            <a:extLst>
+              <a:ext uri="{FF2B5EF4-FFF2-40B4-BE49-F238E27FC236}">
+                <a16:creationId xmlns:a16="http://schemas.microsoft.com/office/drawing/2014/main" id="{1D1334D3-3BC5-4A44-90E5-26EDD7F3FC51}"/>
+              </a:ext>
+            </a:extLst>
+          </p:cNvPr>
+          <p:cNvSpPr>
+            <a:spLocks noGrp="1"/>
+          </p:cNvSpPr>
+          <p:nvPr>
+            <p:ph sz="half" idx="1"/>
+          </p:nvPr>
+        </p:nvSpPr>
+        <p:spPr/>
+        <p:txBody>
+          <a:bodyPr/>
+          <a:lstStyle/>
+          <a:p>
+            <a:endParaRPr lang="el-GR"/>
+          </a:p>
+        </p:txBody>
+      </p:sp>
+      <p:sp>
+        <p:nvSpPr>
+          <p:cNvPr id="4" name="Θέση περιεχομένου 3">
+            <a:extLst>
+              <a:ext uri="{FF2B5EF4-FFF2-40B4-BE49-F238E27FC236}">
+                <a16:creationId xmlns:a16="http://schemas.microsoft.com/office/drawing/2014/main" id="{E66595A6-5DE1-4ACA-B46C-1C05847A5347}"/>
+              </a:ext>
+            </a:extLst>
+          </p:cNvPr>
+          <p:cNvSpPr>
+            <a:spLocks noGrp="1"/>
+          </p:cNvSpPr>
+          <p:nvPr>
+            <p:ph sz="half" idx="2"/>
+          </p:nvPr>
+        </p:nvSpPr>
+        <p:spPr/>
+        <p:txBody>
+          <a:bodyPr/>
+          <a:lstStyle/>
+          <a:p>
+            <a:endParaRPr lang="el-GR"/>
+          </a:p>
+        </p:txBody>
+      </p:sp>
+    </p:spTree>
+    <p:extLst>
+      <p:ext uri="{BB962C8B-B14F-4D97-AF65-F5344CB8AC3E}">
+        <p14:creationId xmlns:p14="http://schemas.microsoft.com/office/powerpoint/2010/main" val="3034707825"/>
+      </p:ext>
+    </p:extLst>
+  </p:cSld>
+  <p:clrMapOvr>
+    <a:masterClrMapping/>
+  </p:clrMapOvr>
+  <p:transition spd="slow">
+    <p:push dir="u"/>
+  </p:transition>
+</p:sld>
+</file>
+
+<file path=ppt/slides/slide12.xml><?xml version="1.0" encoding="utf-8"?>
+<p:sld xmlns:a="http://schemas.openxmlformats.org/drawingml/2006/main" xmlns:r="http://schemas.openxmlformats.org/officeDocument/2006/relationships" xmlns:p="http://schemas.openxmlformats.org/presentationml/2006/main">
+  <p:cSld>
+    <p:spTree>
+      <p:nvGrpSpPr>
+        <p:cNvPr id="1" name=""/>
+        <p:cNvGrpSpPr/>
+        <p:nvPr/>
+      </p:nvGrpSpPr>
+      <p:grpSpPr>
+        <a:xfrm>
+          <a:off x="0" y="0"/>
+          <a:ext cx="0" cy="0"/>
+          <a:chOff x="0" y="0"/>
+          <a:chExt cx="0" cy="0"/>
+        </a:xfrm>
+      </p:grpSpPr>
+      <p:sp>
+        <p:nvSpPr>
+          <p:cNvPr id="2" name="Τίτλος 1">
+            <a:extLst>
+              <a:ext uri="{FF2B5EF4-FFF2-40B4-BE49-F238E27FC236}">
+                <a16:creationId xmlns:a16="http://schemas.microsoft.com/office/drawing/2014/main" id="{8C00DAD0-3F5C-4917-A7D5-A3D10C3144EA}"/>
+              </a:ext>
+            </a:extLst>
+          </p:cNvPr>
+          <p:cNvSpPr>
+            <a:spLocks noGrp="1"/>
+          </p:cNvSpPr>
+          <p:nvPr>
+            <p:ph type="title"/>
+          </p:nvPr>
+        </p:nvSpPr>
+        <p:spPr/>
+        <p:txBody>
+          <a:bodyPr/>
+          <a:lstStyle/>
+          <a:p>
+            <a:r>
+              <a:rPr lang="en-US" dirty="0" err="1"/>
+              <a:t>github</a:t>
+            </a:r>
+            <a:endParaRPr lang="el-GR" dirty="0"/>
+          </a:p>
+        </p:txBody>
+      </p:sp>
+      <p:sp>
+        <p:nvSpPr>
+          <p:cNvPr id="3" name="Θέση περιεχομένου 2">
+            <a:extLst>
+              <a:ext uri="{FF2B5EF4-FFF2-40B4-BE49-F238E27FC236}">
+                <a16:creationId xmlns:a16="http://schemas.microsoft.com/office/drawing/2014/main" id="{A6FF4638-58AE-4F9F-BEB5-E0E22CA065D6}"/>
+              </a:ext>
+            </a:extLst>
+          </p:cNvPr>
+          <p:cNvSpPr>
+            <a:spLocks noGrp="1"/>
+          </p:cNvSpPr>
+          <p:nvPr>
+            <p:ph sz="half" idx="1"/>
+          </p:nvPr>
+        </p:nvSpPr>
+        <p:spPr>
+          <a:xfrm>
+            <a:off x="1024126" y="2286000"/>
+            <a:ext cx="9861963" cy="4023360"/>
+          </a:xfrm>
+        </p:spPr>
+        <p:txBody>
+          <a:bodyPr/>
+          <a:lstStyle/>
+          <a:p>
+            <a:r>
+              <a:rPr lang="el-GR" dirty="0"/>
+              <a:t>Τα αρχεία του κώδικα καθώς και η</a:t>
+            </a:r>
+            <a:r>
+              <a:rPr lang="en-US" dirty="0"/>
+              <a:t> </a:t>
+            </a:r>
+            <a:r>
+              <a:rPr lang="el-GR" dirty="0"/>
+              <a:t>παρουσίαση βρίσκονται στο εξής </a:t>
+            </a:r>
+            <a:r>
+              <a:rPr lang="en-US" dirty="0"/>
+              <a:t>link:</a:t>
+            </a:r>
+            <a:endParaRPr lang="el-GR" dirty="0"/>
+          </a:p>
+        </p:txBody>
+      </p:sp>
+    </p:spTree>
+    <p:extLst>
+      <p:ext uri="{BB962C8B-B14F-4D97-AF65-F5344CB8AC3E}">
+        <p14:creationId xmlns:p14="http://schemas.microsoft.com/office/powerpoint/2010/main" val="1058767610"/>
+      </p:ext>
+    </p:extLst>
+  </p:cSld>
+  <p:clrMapOvr>
+    <a:masterClrMapping/>
+  </p:clrMapOvr>
+  <p:transition spd="slow">
+    <p:push dir="u"/>
+  </p:transition>
+</p:sld>
+</file>
+
+<file path=ppt/slides/slide13.xml><?xml version="1.0" encoding="utf-8"?>
+<p:sld xmlns:a="http://schemas.openxmlformats.org/drawingml/2006/main" xmlns:r="http://schemas.openxmlformats.org/officeDocument/2006/relationships" xmlns:p="http://schemas.openxmlformats.org/presentationml/2006/main">
+  <p:cSld>
+    <p:spTree>
+      <p:nvGrpSpPr>
+        <p:cNvPr id="1" name=""/>
+        <p:cNvGrpSpPr/>
+        <p:nvPr/>
+      </p:nvGrpSpPr>
+      <p:grpSpPr>
+        <a:xfrm>
+          <a:off x="0" y="0"/>
+          <a:ext cx="0" cy="0"/>
+          <a:chOff x="0" y="0"/>
+          <a:chExt cx="0" cy="0"/>
+        </a:xfrm>
+      </p:grpSpPr>
+      <p:sp>
+        <p:nvSpPr>
+          <p:cNvPr id="2" name="Τίτλος 1">
+            <a:extLst>
+              <a:ext uri="{FF2B5EF4-FFF2-40B4-BE49-F238E27FC236}">
+                <a16:creationId xmlns:a16="http://schemas.microsoft.com/office/drawing/2014/main" id="{D3B5979B-DAA2-4179-A467-7A963AB07EB6}"/>
+              </a:ext>
+            </a:extLst>
+          </p:cNvPr>
+          <p:cNvSpPr>
+            <a:spLocks noGrp="1"/>
+          </p:cNvSpPr>
+          <p:nvPr>
+            <p:ph type="title"/>
+          </p:nvPr>
+        </p:nvSpPr>
+        <p:spPr/>
+        <p:txBody>
+          <a:bodyPr/>
+          <a:lstStyle/>
+          <a:p>
+            <a:r>
+              <a:rPr lang="el-GR" b="1" dirty="0"/>
+              <a:t>Πηγες</a:t>
+            </a:r>
+            <a:r>
+              <a:rPr lang="en-US" b="1" dirty="0"/>
+              <a:t> kai </a:t>
+            </a:r>
+            <a:r>
+              <a:rPr lang="el-GR" b="1" dirty="0"/>
+              <a:t>Βιβλιογραφια</a:t>
+            </a:r>
+          </a:p>
+        </p:txBody>
+      </p:sp>
+      <p:sp>
+        <p:nvSpPr>
+          <p:cNvPr id="3" name="Θέση περιεχομένου 2">
+            <a:extLst>
+              <a:ext uri="{FF2B5EF4-FFF2-40B4-BE49-F238E27FC236}">
+                <a16:creationId xmlns:a16="http://schemas.microsoft.com/office/drawing/2014/main" id="{2C15E7EE-1AAC-44FA-9CBE-14186AB94BEE}"/>
+              </a:ext>
+            </a:extLst>
+          </p:cNvPr>
+          <p:cNvSpPr>
+            <a:spLocks noGrp="1"/>
+          </p:cNvSpPr>
+          <p:nvPr>
+            <p:ph idx="1"/>
+          </p:nvPr>
+        </p:nvSpPr>
+        <p:spPr>
+          <a:xfrm>
+            <a:off x="1024128" y="2435291"/>
+            <a:ext cx="9720073" cy="3421599"/>
+          </a:xfrm>
+        </p:spPr>
+        <p:txBody>
+          <a:bodyPr>
+            <a:normAutofit fontScale="25000" lnSpcReduction="20000"/>
+          </a:bodyPr>
+          <a:lstStyle/>
+          <a:p>
+            <a:r>
+              <a:rPr lang="el-GR" sz="4800" b="1" dirty="0"/>
+              <a:t>Για το </a:t>
+            </a:r>
+            <a:r>
+              <a:rPr lang="en-US" sz="4800" b="1" dirty="0"/>
+              <a:t>setup </a:t>
+            </a:r>
+            <a:r>
+              <a:rPr lang="el-GR" sz="4800" b="1" dirty="0"/>
+              <a:t>της εργασίας και το ερώτημα 1</a:t>
+            </a:r>
+            <a:r>
+              <a:rPr lang="en-US" sz="4800" b="1" dirty="0"/>
+              <a:t>:</a:t>
+            </a:r>
+            <a:br>
+              <a:rPr lang="en-US" sz="4800" dirty="0"/>
+            </a:br>
+            <a:br>
+              <a:rPr lang="en-US" sz="4800" dirty="0"/>
+            </a:br>
+            <a:r>
+              <a:rPr lang="en-US" sz="4800" dirty="0">
+                <a:solidFill>
+                  <a:schemeClr val="accent1">
+                    <a:lumMod val="75000"/>
+                  </a:schemeClr>
+                </a:solidFill>
+                <a:hlinkClick r:id="rId2">
+                  <a:extLst>
+                    <a:ext uri="{A12FA001-AC4F-418D-AE19-62706E023703}">
+                      <ahyp:hlinkClr xmlns:ahyp="http://schemas.microsoft.com/office/drawing/2018/hyperlinkcolor" val="tx"/>
+                    </a:ext>
+                  </a:extLst>
+                </a:hlinkClick>
+              </a:rPr>
+              <a:t>https://www.nsnam.org/documentation/</a:t>
+            </a:r>
+            <a:endParaRPr lang="el-GR" sz="4800" dirty="0">
+              <a:solidFill>
+                <a:schemeClr val="accent1">
+                  <a:lumMod val="75000"/>
+                </a:schemeClr>
+              </a:solidFill>
+            </a:endParaRPr>
+          </a:p>
+          <a:p>
+            <a:r>
+              <a:rPr lang="en-US" sz="4800" dirty="0">
+                <a:solidFill>
+                  <a:schemeClr val="accent1">
+                    <a:lumMod val="75000"/>
+                  </a:schemeClr>
+                </a:solidFill>
+                <a:hlinkClick r:id="rId3">
+                  <a:extLst>
+                    <a:ext uri="{A12FA001-AC4F-418D-AE19-62706E023703}">
+                      <ahyp:hlinkClr xmlns:ahyp="http://schemas.microsoft.com/office/drawing/2018/hyperlinkcolor" val="tx"/>
+                    </a:ext>
+                  </a:extLst>
+                </a:hlinkClick>
+              </a:rPr>
+              <a:t>https://www.nsnam.org/docs/contributing/html/coding-style.html#header-file-includes</a:t>
+            </a:r>
+            <a:endParaRPr lang="el-GR" sz="4800" dirty="0">
+              <a:solidFill>
+                <a:schemeClr val="accent1">
+                  <a:lumMod val="75000"/>
+                </a:schemeClr>
+              </a:solidFill>
+            </a:endParaRPr>
+          </a:p>
+          <a:p>
+            <a:r>
+              <a:rPr lang="en-US" sz="4800" dirty="0">
+                <a:solidFill>
+                  <a:schemeClr val="accent1">
+                    <a:lumMod val="75000"/>
+                  </a:schemeClr>
+                </a:solidFill>
+                <a:hlinkClick r:id="rId4">
+                  <a:extLst>
+                    <a:ext uri="{A12FA001-AC4F-418D-AE19-62706E023703}">
+                      <ahyp:hlinkClr xmlns:ahyp="http://schemas.microsoft.com/office/drawing/2018/hyperlinkcolor" val="tx"/>
+                    </a:ext>
+                  </a:extLst>
+                </a:hlinkClick>
+              </a:rPr>
+              <a:t>https://www.nsnam.org/docs/tutorial/html/</a:t>
+            </a:r>
+            <a:endParaRPr lang="en-US" sz="4800" dirty="0">
+              <a:solidFill>
+                <a:schemeClr val="accent1">
+                  <a:lumMod val="75000"/>
+                </a:schemeClr>
+              </a:solidFill>
+            </a:endParaRPr>
+          </a:p>
+          <a:p>
+            <a:r>
+              <a:rPr lang="en-US" sz="4800" dirty="0">
+                <a:solidFill>
+                  <a:schemeClr val="accent1">
+                    <a:lumMod val="75000"/>
+                  </a:schemeClr>
+                </a:solidFill>
+                <a:hlinkClick r:id="rId5">
+                  <a:extLst>
+                    <a:ext uri="{A12FA001-AC4F-418D-AE19-62706E023703}">
+                      <ahyp:hlinkClr xmlns:ahyp="http://schemas.microsoft.com/office/drawing/2018/hyperlinkcolor" val="tx"/>
+                    </a:ext>
+                  </a:extLst>
+                </a:hlinkClick>
+              </a:rPr>
+              <a:t>https://www.youtube.com/watch?v=Jv_swgcykjQ</a:t>
+            </a:r>
+            <a:endParaRPr lang="en-US" sz="4800" dirty="0">
+              <a:solidFill>
+                <a:schemeClr val="accent1">
+                  <a:lumMod val="75000"/>
+                </a:schemeClr>
+              </a:solidFill>
+            </a:endParaRPr>
+          </a:p>
+          <a:p>
+            <a:r>
+              <a:rPr lang="en-US" sz="4800" dirty="0">
+                <a:solidFill>
+                  <a:schemeClr val="accent1">
+                    <a:lumMod val="75000"/>
+                  </a:schemeClr>
+                </a:solidFill>
+                <a:hlinkClick r:id="rId6">
+                  <a:extLst>
+                    <a:ext uri="{A12FA001-AC4F-418D-AE19-62706E023703}">
+                      <ahyp:hlinkClr xmlns:ahyp="http://schemas.microsoft.com/office/drawing/2018/hyperlinkcolor" val="tx"/>
+                    </a:ext>
+                  </a:extLst>
+                </a:hlinkClick>
+              </a:rPr>
+              <a:t>https://www.youtube.com/watch?v=2W5mdzQrwXI</a:t>
+            </a:r>
+            <a:endParaRPr lang="en-US" sz="4800" dirty="0">
+              <a:solidFill>
+                <a:schemeClr val="accent1">
+                  <a:lumMod val="75000"/>
+                </a:schemeClr>
+              </a:solidFill>
+            </a:endParaRPr>
+          </a:p>
+          <a:p>
+            <a:r>
+              <a:rPr lang="en-US" sz="4800" dirty="0">
+                <a:solidFill>
+                  <a:schemeClr val="accent1">
+                    <a:lumMod val="75000"/>
+                  </a:schemeClr>
+                </a:solidFill>
+                <a:hlinkClick r:id="rId7">
+                  <a:extLst>
+                    <a:ext uri="{A12FA001-AC4F-418D-AE19-62706E023703}">
+                      <ahyp:hlinkClr xmlns:ahyp="http://schemas.microsoft.com/office/drawing/2018/hyperlinkcolor" val="tx"/>
+                    </a:ext>
+                  </a:extLst>
+                </a:hlinkClick>
+              </a:rPr>
+              <a:t>https://www.nsnam.org/docs/tutorial/html/building-topologies.html</a:t>
+            </a:r>
+            <a:endParaRPr lang="el-GR" sz="4800" dirty="0">
+              <a:solidFill>
+                <a:schemeClr val="accent1">
+                  <a:lumMod val="75000"/>
+                </a:schemeClr>
+              </a:solidFill>
+            </a:endParaRPr>
+          </a:p>
+          <a:p>
+            <a:r>
+              <a:rPr lang="el-GR" sz="4800" b="1" dirty="0">
+                <a:solidFill>
+                  <a:schemeClr val="tx1">
+                    <a:lumMod val="95000"/>
+                    <a:lumOff val="5000"/>
+                  </a:schemeClr>
+                </a:solidFill>
+              </a:rPr>
+              <a:t>Για το ερώτημα 2</a:t>
+            </a:r>
+            <a:r>
+              <a:rPr lang="en-US" sz="4800" b="1" dirty="0">
+                <a:solidFill>
+                  <a:schemeClr val="tx1">
+                    <a:lumMod val="95000"/>
+                    <a:lumOff val="5000"/>
+                  </a:schemeClr>
+                </a:solidFill>
+              </a:rPr>
+              <a:t>:</a:t>
+            </a:r>
+            <a:endParaRPr lang="el-GR" sz="4800" b="1" dirty="0">
+              <a:solidFill>
+                <a:schemeClr val="tx1">
+                  <a:lumMod val="95000"/>
+                  <a:lumOff val="5000"/>
+                </a:schemeClr>
+              </a:solidFill>
+            </a:endParaRPr>
+          </a:p>
+          <a:p>
+            <a:r>
+              <a:rPr lang="en-US" sz="4800" dirty="0">
+                <a:hlinkClick r:id="rId8" tooltip="https://ns3-code.com/how-to-begin-implement-network-failover-in-ns3/"/>
+              </a:rPr>
+              <a:t>https://ns3-code.com/how-to-begin-implement-network-failover-in-ns3/</a:t>
+            </a:r>
+            <a:endParaRPr lang="en-US" sz="4800" dirty="0"/>
+          </a:p>
+          <a:p>
+            <a:r>
+              <a:rPr lang="en-US" sz="4800" dirty="0"/>
+              <a:t>https://ns3-code.com/how-to-begin-implement-dynamic-routing-in-ns3/</a:t>
+            </a:r>
+            <a:endParaRPr lang="el-GR" sz="4800" dirty="0"/>
+          </a:p>
+          <a:p>
+            <a:endParaRPr lang="el-GR" sz="4800" dirty="0">
+              <a:solidFill>
+                <a:schemeClr val="tx1">
+                  <a:lumMod val="95000"/>
+                  <a:lumOff val="5000"/>
+                </a:schemeClr>
+              </a:solidFill>
+            </a:endParaRPr>
+          </a:p>
+          <a:p>
+            <a:r>
+              <a:rPr lang="el-GR" sz="4800" dirty="0">
+                <a:hlinkClick r:id="rId9" tooltip="https://networksimulationtools.com/how-to-run-netanim-in-ns3/"/>
+              </a:rPr>
+              <a:t>[</a:t>
+            </a:r>
+            <a:r>
+              <a:rPr lang="en-US" sz="4800" dirty="0">
+                <a:hlinkClick r:id="rId9" tooltip="https://networksimulationtools.com/how-to-run-netanim-in-ns3/"/>
+              </a:rPr>
+              <a:t>https://networksimulationtools.com/how-to-run-netanim-in-ns3/</a:t>
+            </a:r>
+            <a:r>
+              <a:rPr lang="el-GR" sz="4800" dirty="0"/>
+              <a:t>]</a:t>
+            </a:r>
+            <a:endParaRPr lang="en-US" sz="4800" dirty="0">
+              <a:solidFill>
+                <a:schemeClr val="tx1">
+                  <a:lumMod val="95000"/>
+                  <a:lumOff val="5000"/>
+                </a:schemeClr>
+              </a:solidFill>
+            </a:endParaRPr>
+          </a:p>
+          <a:p>
+            <a:endParaRPr lang="el-GR" sz="2600" dirty="0">
+              <a:solidFill>
+                <a:schemeClr val="accent1">
+                  <a:lumMod val="75000"/>
+                </a:schemeClr>
+              </a:solidFill>
+            </a:endParaRPr>
+          </a:p>
+          <a:p>
+            <a:endParaRPr lang="en-US" sz="2600" dirty="0">
+              <a:solidFill>
+                <a:schemeClr val="accent1">
+                  <a:lumMod val="75000"/>
+                </a:schemeClr>
+              </a:solidFill>
+            </a:endParaRPr>
+          </a:p>
+          <a:p>
+            <a:br>
+              <a:rPr lang="en-US" dirty="0"/>
+            </a:br>
+            <a:endParaRPr lang="el-GR" dirty="0"/>
+          </a:p>
+        </p:txBody>
+      </p:sp>
+    </p:spTree>
+    <p:extLst>
+      <p:ext uri="{BB962C8B-B14F-4D97-AF65-F5344CB8AC3E}">
+        <p14:creationId xmlns:p14="http://schemas.microsoft.com/office/powerpoint/2010/main" val="1234120531"/>
+      </p:ext>
+    </p:extLst>
+  </p:cSld>
+  <p:clrMapOvr>
+    <a:masterClrMapping/>
+  </p:clrMapOvr>
+  <p:transition spd="slow">
+    <p:push dir="u"/>
+  </p:transition>
+</p:sld>
+</file>
+
 <file path=ppt/slides/slide2.xml><?xml version="1.0" encoding="utf-8"?>
 <p:sld xmlns:a="http://schemas.openxmlformats.org/drawingml/2006/main" xmlns:r="http://schemas.openxmlformats.org/officeDocument/2006/relationships" xmlns:p="http://schemas.openxmlformats.org/presentationml/2006/main">
   <p:cSld>
@@ -21858,13 +23253,13 @@
             <a:endParaRPr lang="el-GR" dirty="0"/>
           </a:p>
           <a:p>
-            <a:pPr marL="0" indent="0">
+            <a:pPr marL="0" indent="0" algn="just">
               <a:buNone/>
             </a:pPr>
             <a:endParaRPr lang="en-US" sz="1000" dirty="0"/>
           </a:p>
           <a:p>
-            <a:pPr marL="173736" lvl="1" indent="0">
+            <a:pPr marL="173736" lvl="1" indent="0" algn="just">
               <a:buNone/>
             </a:pPr>
             <a:r>
@@ -21903,7 +23298,7 @@
             </a:r>
           </a:p>
           <a:p>
-            <a:pPr marL="173736" lvl="1" indent="0">
+            <a:pPr marL="173736" lvl="1" indent="0" algn="just">
               <a:buNone/>
             </a:pPr>
             <a:r>
@@ -22031,70 +23426,74 @@
             </a:pPr>
             <a:r>
               <a:rPr lang="el-GR" dirty="0"/>
-              <a:t>Πιο συγκεκριμένα για τα δύο μέρη της εργασίας </a:t>
+              <a:t>Πιο συγκεκριμένα για το πρώτο ερώτημα της εργασίας</a:t>
             </a:r>
             <a:r>
               <a:rPr lang="en-US" dirty="0"/>
               <a:t>:</a:t>
             </a:r>
-            <a:endParaRPr lang="el-GR" dirty="0"/>
           </a:p>
           <a:p>
-            <a:pPr marL="457200" indent="-457200">
-              <a:buFont typeface="+mj-lt"/>
-              <a:buAutoNum type="arabicPeriod"/>
+            <a:pPr marL="0" indent="0">
+              <a:buNone/>
             </a:pPr>
             <a:r>
-              <a:rPr lang="el-GR" sz="2000" dirty="0"/>
-              <a:t>Στην προσομοίωση σημείο</a:t>
-            </a:r>
-            <a:r>
               <a:rPr lang="en-US" sz="2000" dirty="0"/>
-              <a:t> </a:t>
+              <a:t>1.</a:t>
             </a:r>
             <a:r>
               <a:rPr lang="el-GR" sz="2000" dirty="0"/>
-              <a:t>προς</a:t>
-            </a:r>
-            <a:r>
-              <a:rPr lang="en-US" sz="2000" dirty="0"/>
-              <a:t> </a:t>
-            </a:r>
-            <a:r>
-              <a:rPr lang="el-GR" sz="2000" dirty="0"/>
-              <a:t>σημείο δημιουργείται μια προσομοίωση με 2 κόμβους. Ορίζονται τα χαρακτηριστικά της σύνδεσης και αντιστοιχίζονται διευθύνσεις τύπου ipv4 στις διεπαφές των κόμβων.</a:t>
+              <a:t>Ορίζονται τα χαρακτηριστικά της σύνδεσης και αντιστοιχίζονται διευθύνσεις τύπου ipv4 στις διεπαφές των κόμβων.</a:t>
             </a:r>
             <a:br>
               <a:rPr lang="el-GR" sz="2000" dirty="0"/>
             </a:br>
-            <a:endParaRPr lang="el-GR" sz="2000" dirty="0"/>
+            <a:endParaRPr lang="en-US" sz="2000" dirty="0"/>
           </a:p>
           <a:p>
-            <a:pPr marL="457200" indent="-457200">
-              <a:buFont typeface="+mj-lt"/>
-              <a:buAutoNum type="arabicPeriod"/>
+            <a:pPr marL="0" indent="0">
+              <a:buNone/>
             </a:pPr>
             <a:r>
+              <a:rPr lang="en-US" sz="2000" dirty="0"/>
+              <a:t>2.</a:t>
+            </a:r>
+            <a:r>
               <a:rPr lang="el-GR" sz="2000" dirty="0"/>
-              <a:t> Τέλος, υλοποιήθηκαν δύο servers UDP echo στον κόμβο 1 σε διαφορετικές θύρες με δημιουργία δύο πελατών  UDP echo στον κόμβο 0. </a:t>
+              <a:t> </a:t>
+            </a:r>
+            <a:r>
+              <a:rPr lang="en-US" sz="2000" dirty="0"/>
+              <a:t>Y</a:t>
+            </a:r>
+            <a:r>
+              <a:rPr lang="el-GR" sz="2000" dirty="0" err="1"/>
+              <a:t>λοποιήθηκαν</a:t>
+            </a:r>
+            <a:r>
+              <a:rPr lang="el-GR" sz="2000" dirty="0"/>
+              <a:t> δύο servers UDP echo στον κόμβο 1 σε διαφορετικές θύρες με δημιουργία δύο πελατών  UDP echo στον κόμβο 0. </a:t>
             </a:r>
             <a:br>
               <a:rPr lang="el-GR" sz="2000" dirty="0"/>
             </a:br>
-            <a:endParaRPr lang="el-GR" sz="2000" dirty="0"/>
+            <a:endParaRPr lang="en-US" sz="2000" dirty="0"/>
           </a:p>
           <a:p>
-            <a:pPr marL="457200" indent="-457200">
-              <a:buFont typeface="+mj-lt"/>
-              <a:buAutoNum type="arabicPeriod"/>
+            <a:pPr marL="0" indent="0">
+              <a:buNone/>
             </a:pPr>
             <a:r>
+              <a:rPr lang="en-US" sz="2000" dirty="0"/>
+              <a:t>3.T</a:t>
+            </a:r>
+            <a:r>
               <a:rPr lang="el-GR" sz="2000" dirty="0"/>
-              <a:t>Εκτέλεση της προσομοίωσης και καταγραφή των δεδομένων ροής με χρήση </a:t>
+              <a:t>έλος, εκτελέστηκε η προσομοίωση και καταγράφτηκαν τα δεδομένα ροής με χρήση του </a:t>
             </a:r>
             <a:r>
               <a:rPr lang="en-US" sz="2000" dirty="0"/>
-              <a:t>Flow-Monitoring</a:t>
+              <a:t>module Flow-Monitoring</a:t>
             </a:r>
             <a:r>
               <a:rPr lang="el-GR" sz="2000" dirty="0"/>
@@ -22120,6 +23519,123 @@
 </file>
 
 <file path=ppt/slides/slide4.xml><?xml version="1.0" encoding="utf-8"?>
+<p:sld xmlns:a="http://schemas.openxmlformats.org/drawingml/2006/main" xmlns:r="http://schemas.openxmlformats.org/officeDocument/2006/relationships" xmlns:p="http://schemas.openxmlformats.org/presentationml/2006/main">
+  <p:cSld>
+    <p:spTree>
+      <p:nvGrpSpPr>
+        <p:cNvPr id="1" name=""/>
+        <p:cNvGrpSpPr/>
+        <p:nvPr/>
+      </p:nvGrpSpPr>
+      <p:grpSpPr>
+        <a:xfrm>
+          <a:off x="0" y="0"/>
+          <a:ext cx="0" cy="0"/>
+          <a:chOff x="0" y="0"/>
+          <a:chExt cx="0" cy="0"/>
+        </a:xfrm>
+      </p:grpSpPr>
+      <p:sp>
+        <p:nvSpPr>
+          <p:cNvPr id="2" name="Τίτλος 1">
+            <a:extLst>
+              <a:ext uri="{FF2B5EF4-FFF2-40B4-BE49-F238E27FC236}">
+                <a16:creationId xmlns:a16="http://schemas.microsoft.com/office/drawing/2014/main" id="{A6C17167-0FCF-48D1-8D35-A3B397602971}"/>
+              </a:ext>
+            </a:extLst>
+          </p:cNvPr>
+          <p:cNvSpPr>
+            <a:spLocks noGrp="1"/>
+          </p:cNvSpPr>
+          <p:nvPr>
+            <p:ph type="title"/>
+          </p:nvPr>
+        </p:nvSpPr>
+        <p:spPr/>
+        <p:txBody>
+          <a:bodyPr/>
+          <a:lstStyle/>
+          <a:p>
+            <a:r>
+              <a:rPr lang="el-GR" sz="5400" b="1" dirty="0" err="1"/>
+              <a:t>Κυριο</a:t>
+            </a:r>
+            <a:r>
+              <a:rPr lang="el-GR" sz="5400" b="1" dirty="0"/>
+              <a:t> </a:t>
+            </a:r>
+            <a:r>
+              <a:rPr lang="el-GR" sz="5400" b="1" dirty="0" err="1"/>
+              <a:t>θεμα</a:t>
+            </a:r>
+            <a:r>
+              <a:rPr lang="el-GR" sz="5400" b="1" dirty="0"/>
+              <a:t> της </a:t>
+            </a:r>
+            <a:r>
+              <a:rPr lang="el-GR" sz="5400" b="1" dirty="0" err="1"/>
+              <a:t>εργασιασ</a:t>
+            </a:r>
+            <a:r>
+              <a:rPr lang="el-GR" sz="5400" b="1" dirty="0"/>
+              <a:t> (3)</a:t>
+            </a:r>
+            <a:endParaRPr lang="el-GR" dirty="0"/>
+          </a:p>
+        </p:txBody>
+      </p:sp>
+      <p:sp>
+        <p:nvSpPr>
+          <p:cNvPr id="3" name="Θέση περιεχομένου 2">
+            <a:extLst>
+              <a:ext uri="{FF2B5EF4-FFF2-40B4-BE49-F238E27FC236}">
+                <a16:creationId xmlns:a16="http://schemas.microsoft.com/office/drawing/2014/main" id="{8C25AA44-A744-4CDE-8CD1-73BA1F80A72C}"/>
+              </a:ext>
+            </a:extLst>
+          </p:cNvPr>
+          <p:cNvSpPr>
+            <a:spLocks noGrp="1"/>
+          </p:cNvSpPr>
+          <p:nvPr>
+            <p:ph idx="1"/>
+          </p:nvPr>
+        </p:nvSpPr>
+        <p:spPr/>
+        <p:txBody>
+          <a:bodyPr/>
+          <a:lstStyle/>
+          <a:p>
+            <a:r>
+              <a:rPr lang="el-GR" dirty="0"/>
+              <a:t>Πιο συγκεκριμένα για το δεύτερο ερώτημα της εργασίας</a:t>
+            </a:r>
+            <a:r>
+              <a:rPr lang="en-US" dirty="0"/>
+              <a:t>:</a:t>
+            </a:r>
+          </a:p>
+          <a:p>
+            <a:endParaRPr lang="el-GR" dirty="0"/>
+          </a:p>
+        </p:txBody>
+      </p:sp>
+    </p:spTree>
+    <p:extLst>
+      <p:ext uri="{BB962C8B-B14F-4D97-AF65-F5344CB8AC3E}">
+        <p14:creationId xmlns:p14="http://schemas.microsoft.com/office/powerpoint/2010/main" val="895146049"/>
+      </p:ext>
+    </p:extLst>
+  </p:cSld>
+  <p:clrMapOvr>
+    <a:masterClrMapping/>
+  </p:clrMapOvr>
+  <p:transition spd="slow">
+    <p:push dir="u"/>
+  </p:transition>
+</p:sld>
+</file>
+
+<file path=ppt/slides/slide5.xml><?xml version="1.0" encoding="utf-8"?>
 <p:sld xmlns:a="http://schemas.openxmlformats.org/drawingml/2006/main" xmlns:r="http://schemas.openxmlformats.org/officeDocument/2006/relationships" xmlns:p="http://schemas.openxmlformats.org/presentationml/2006/main">
   <p:cSld>
     <p:spTree>
@@ -22196,8 +23712,8 @@
         </p:nvSpPr>
         <p:spPr>
           <a:xfrm>
-            <a:off x="1024128" y="2220683"/>
-            <a:ext cx="9720073" cy="4023360"/>
+            <a:off x="837516" y="1900996"/>
+            <a:ext cx="10051148" cy="4023360"/>
           </a:xfrm>
         </p:spPr>
         <p:txBody>
@@ -22263,12 +23779,35 @@
               <a:t>και </a:t>
             </a:r>
             <a:r>
+              <a:rPr lang="en-US" dirty="0" err="1"/>
+              <a:t>github</a:t>
+            </a:r>
+            <a:r>
               <a:rPr lang="en-US" dirty="0"/>
-              <a:t>GitHub </a:t>
+              <a:t> </a:t>
             </a:r>
             <a:r>
               <a:rPr lang="el-GR" dirty="0"/>
               <a:t>για την επικοινωνία και τον συγχρονισμό των μελών της ομάδας.</a:t>
+            </a:r>
+            <a:endParaRPr lang="en-US" dirty="0"/>
+          </a:p>
+          <a:p>
+            <a:pPr>
+              <a:buFont typeface="Arial" panose="020B0604020202020204" pitchFamily="34" charset="0"/>
+              <a:buChar char="•"/>
+            </a:pPr>
+            <a:r>
+              <a:rPr lang="en-US" dirty="0" err="1"/>
+              <a:t>Drawio</a:t>
+            </a:r>
+            <a:r>
+              <a:rPr lang="en-US" dirty="0"/>
+              <a:t> </a:t>
+            </a:r>
+            <a:r>
+              <a:rPr lang="el-GR" dirty="0"/>
+              <a:t>για την υλοποίηση σχεδιαγραμμάτων/τοπολογίας.</a:t>
             </a:r>
             <a:endParaRPr lang="en-US" dirty="0"/>
           </a:p>
@@ -22410,7 +23949,7 @@
 </p:sld>
 </file>
 
-<file path=ppt/slides/slide5.xml><?xml version="1.0" encoding="utf-8"?>
+<file path=ppt/slides/slide6.xml><?xml version="1.0" encoding="utf-8"?>
 <p:sld xmlns:a="http://schemas.openxmlformats.org/drawingml/2006/main" xmlns:r="http://schemas.openxmlformats.org/officeDocument/2006/relationships" xmlns:p="http://schemas.openxmlformats.org/presentationml/2006/main">
   <p:cSld>
     <p:spTree>
@@ -22497,8 +24036,8 @@
         </p:nvSpPr>
         <p:spPr>
           <a:xfrm>
-            <a:off x="653141" y="2319962"/>
-            <a:ext cx="6587413" cy="4204749"/>
+            <a:off x="653142" y="2319962"/>
+            <a:ext cx="6567466" cy="4419797"/>
           </a:xfrm>
         </p:spPr>
         <p:txBody>
@@ -22507,7 +24046,7 @@
           </a:bodyPr>
           <a:lstStyle/>
           <a:p>
-            <a:pPr>
+            <a:pPr algn="just">
               <a:buFont typeface="Arial" panose="020B0604020202020204" pitchFamily="34" charset="0"/>
               <a:buChar char="•"/>
             </a:pPr>
@@ -22521,39 +24060,15 @@
             </a:r>
             <a:r>
               <a:rPr lang="en-US" dirty="0"/>
-              <a:t>GitHub </a:t>
+              <a:t>GitHub</a:t>
             </a:r>
             <a:r>
               <a:rPr lang="el-GR" dirty="0"/>
-              <a:t>σε αρχικό στάδιο με ελλειπές υλικό για την ώρα (γι</a:t>
-            </a:r>
-            <a:r>
-              <a:rPr lang="en-US" dirty="0"/>
-              <a:t>’</a:t>
-            </a:r>
-            <a:r>
-              <a:rPr lang="el-GR" dirty="0"/>
-              <a:t>αυτό και </a:t>
-            </a:r>
-            <a:r>
-              <a:rPr lang="en-US" dirty="0"/>
-              <a:t>private)</a:t>
-            </a:r>
-            <a:r>
-              <a:rPr lang="el-GR" dirty="0"/>
-              <a:t> και με στόχο να γίνει </a:t>
-            </a:r>
-            <a:r>
-              <a:rPr lang="en-US" dirty="0"/>
-              <a:t>public </a:t>
-            </a:r>
-            <a:r>
-              <a:rPr lang="el-GR" dirty="0"/>
-              <a:t>όταν ολοκληρωθεί. </a:t>
+              <a:t>.</a:t>
             </a:r>
           </a:p>
           <a:p>
-            <a:pPr>
+            <a:pPr algn="just">
               <a:buFont typeface="Arial" panose="020B0604020202020204" pitchFamily="34" charset="0"/>
               <a:buChar char="•"/>
             </a:pPr>
@@ -22579,7 +24094,7 @@
             </a:r>
           </a:p>
           <a:p>
-            <a:pPr>
+            <a:pPr algn="just">
               <a:buFont typeface="Arial" panose="020B0604020202020204" pitchFamily="34" charset="0"/>
               <a:buChar char="•"/>
             </a:pPr>
@@ -22611,6 +24126,51 @@
               <a:rPr lang="el-GR" dirty="0"/>
               <a:t> που αναφέρονταν στην εργασία.</a:t>
             </a:r>
+          </a:p>
+          <a:p>
+            <a:pPr algn="just">
+              <a:buFont typeface="Arial" panose="020B0604020202020204" pitchFamily="34" charset="0"/>
+              <a:buChar char="•"/>
+            </a:pPr>
+            <a:endParaRPr lang="el-GR" dirty="0"/>
+          </a:p>
+          <a:p>
+            <a:pPr>
+              <a:buFont typeface="Arial" panose="020B0604020202020204" pitchFamily="34" charset="0"/>
+              <a:buChar char="•"/>
+            </a:pPr>
+            <a:r>
+              <a:rPr lang="sv-SE" dirty="0"/>
+              <a:t>internet stack</a:t>
+            </a:r>
+            <a:endParaRPr lang="el-GR" dirty="0"/>
+          </a:p>
+          <a:p>
+            <a:pPr>
+              <a:buFont typeface="Arial" panose="020B0604020202020204" pitchFamily="34" charset="0"/>
+              <a:buChar char="•"/>
+            </a:pPr>
+            <a:r>
+              <a:rPr lang="sv-SE" dirty="0"/>
+              <a:t>CBR</a:t>
+            </a:r>
+            <a:endParaRPr lang="el-GR" dirty="0"/>
+          </a:p>
+          <a:p>
+            <a:pPr>
+              <a:buFont typeface="Arial" panose="020B0604020202020204" pitchFamily="34" charset="0"/>
+              <a:buChar char="•"/>
+            </a:pPr>
+            <a:r>
+              <a:rPr lang="sv-SE" dirty="0"/>
+              <a:t>packet sink</a:t>
+            </a:r>
+          </a:p>
+          <a:p>
+            <a:pPr>
+              <a:buFont typeface="Arial" panose="020B0604020202020204" pitchFamily="34" charset="0"/>
+              <a:buChar char="•"/>
+            </a:pPr>
             <a:br>
               <a:rPr lang="en-US" dirty="0"/>
             </a:br>
@@ -22669,7 +24229,7 @@
 </p:sld>
 </file>
 
-<file path=ppt/slides/slide6.xml><?xml version="1.0" encoding="utf-8"?>
+<file path=ppt/slides/slide7.xml><?xml version="1.0" encoding="utf-8"?>
 <p:sld xmlns:a="http://schemas.openxmlformats.org/drawingml/2006/main" xmlns:r="http://schemas.openxmlformats.org/officeDocument/2006/relationships" xmlns:p="http://schemas.openxmlformats.org/presentationml/2006/main">
   <p:cSld>
     <p:spTree>
@@ -22934,6 +24494,36 @@
           </a:p>
         </p:txBody>
       </p:sp>
+      <p:pic>
+        <p:nvPicPr>
+          <p:cNvPr id="2" name="Εικόνα 1">
+            <a:extLst>
+              <a:ext uri="{FF2B5EF4-FFF2-40B4-BE49-F238E27FC236}">
+                <a16:creationId xmlns:a16="http://schemas.microsoft.com/office/drawing/2014/main" id="{72465A12-DE92-430F-83D8-A8CA456E29B7}"/>
+              </a:ext>
+            </a:extLst>
+          </p:cNvPr>
+          <p:cNvPicPr>
+            <a:picLocks noChangeAspect="1"/>
+          </p:cNvPicPr>
+          <p:nvPr/>
+        </p:nvPicPr>
+        <p:blipFill>
+          <a:blip r:embed="rId2"/>
+          <a:stretch>
+            <a:fillRect/>
+          </a:stretch>
+        </p:blipFill>
+        <p:spPr>
+          <a:xfrm>
+            <a:off x="6596884" y="4396609"/>
+            <a:ext cx="4705350" cy="1485900"/>
+          </a:xfrm>
+          <a:prstGeom prst="rect">
+            <a:avLst/>
+          </a:prstGeom>
+        </p:spPr>
+      </p:pic>
     </p:spTree>
     <p:extLst>
       <p:ext uri="{BB962C8B-B14F-4D97-AF65-F5344CB8AC3E}">
@@ -22950,7 +24540,7 @@
 </p:sld>
 </file>
 
-<file path=ppt/slides/slide7.xml><?xml version="1.0" encoding="utf-8"?>
+<file path=ppt/slides/slide8.xml><?xml version="1.0" encoding="utf-8"?>
 <p:sld xmlns:a="http://schemas.openxmlformats.org/drawingml/2006/main" xmlns:r="http://schemas.openxmlformats.org/officeDocument/2006/relationships" xmlns:p="http://schemas.openxmlformats.org/presentationml/2006/main">
   <p:cSld>
     <p:spTree>
@@ -23025,7 +24615,7 @@
         <p:spPr>
           <a:xfrm>
             <a:off x="1024127" y="2579914"/>
-            <a:ext cx="4754880" cy="1698171"/>
+            <a:ext cx="4754880" cy="3489810"/>
           </a:xfrm>
         </p:spPr>
         <p:txBody>
@@ -23065,6 +24655,38 @@
               <a:buChar char="•"/>
             </a:pPr>
             <a:endParaRPr lang="el-GR" u="sng" dirty="0"/>
+          </a:p>
+          <a:p>
+            <a:pPr>
+              <a:buFont typeface="Arial" panose="020B0604020202020204" pitchFamily="34" charset="0"/>
+              <a:buChar char="•"/>
+            </a:pPr>
+            <a:endParaRPr lang="el-GR" u="sng" dirty="0"/>
+          </a:p>
+          <a:p>
+            <a:pPr marL="0" indent="0">
+              <a:buNone/>
+            </a:pPr>
+            <a:r>
+              <a:rPr lang="el-GR" dirty="0"/>
+              <a:t>+ </a:t>
+            </a:r>
+            <a:r>
+              <a:rPr lang="el-GR" dirty="0" err="1"/>
+              <a:t>καποιο</a:t>
+            </a:r>
+            <a:r>
+              <a:rPr lang="el-GR" dirty="0"/>
+              <a:t> </a:t>
+            </a:r>
+            <a:r>
+              <a:rPr lang="el-GR" dirty="0" err="1"/>
+              <a:t>διαγραμμα</a:t>
+            </a:r>
+            <a:r>
+              <a:rPr lang="el-GR" dirty="0"/>
+              <a:t>?</a:t>
+            </a:r>
           </a:p>
         </p:txBody>
       </p:sp>
@@ -23115,7 +24737,7 @@
 </p:sld>
 </file>
 
-<file path=ppt/slides/slide8.xml><?xml version="1.0" encoding="utf-8"?>
+<file path=ppt/slides/slide9.xml><?xml version="1.0" encoding="utf-8"?>
 <p:sld xmlns:a="http://schemas.openxmlformats.org/drawingml/2006/main" xmlns:r="http://schemas.openxmlformats.org/officeDocument/2006/relationships" xmlns:p="http://schemas.openxmlformats.org/presentationml/2006/main">
   <p:cSld>
     <p:spTree>
@@ -23137,7 +24759,7 @@
           <p:cNvPr id="2" name="Τίτλος 1">
             <a:extLst>
               <a:ext uri="{FF2B5EF4-FFF2-40B4-BE49-F238E27FC236}">
-                <a16:creationId xmlns:a16="http://schemas.microsoft.com/office/drawing/2014/main" id="{D3B5979B-DAA2-4179-A467-7A963AB07EB6}"/>
+                <a16:creationId xmlns:a16="http://schemas.microsoft.com/office/drawing/2014/main" id="{740B5DCF-D7F8-4FA1-B6A2-C54F072B973E}"/>
               </a:ext>
             </a:extLst>
           </p:cNvPr>
@@ -23155,16 +24777,13 @@
           <a:p>
             <a:r>
               <a:rPr lang="el-GR" b="1" dirty="0"/>
-              <a:t>Πηγες</a:t>
+              <a:t>ΔΕΔΟΜΕΝΑ ΓΙΑ ΤΟ ΕΡΩΤΗΜΑ 2</a:t>
             </a:r>
             <a:r>
               <a:rPr lang="en-US" b="1" dirty="0"/>
-              <a:t> kai </a:t>
+              <a:t>(1)</a:t>
             </a:r>
-            <a:r>
-              <a:rPr lang="el-GR" b="1" dirty="0"/>
-              <a:t>Βιβλιογραφια</a:t>
-            </a:r>
+            <a:endParaRPr lang="el-GR" b="1" dirty="0"/>
           </a:p>
         </p:txBody>
       </p:sp>
@@ -23173,7 +24792,7 @@
           <p:cNvPr id="3" name="Θέση περιεχομένου 2">
             <a:extLst>
               <a:ext uri="{FF2B5EF4-FFF2-40B4-BE49-F238E27FC236}">
-                <a16:creationId xmlns:a16="http://schemas.microsoft.com/office/drawing/2014/main" id="{2C15E7EE-1AAC-44FA-9CBE-14186AB94BEE}"/>
+                <a16:creationId xmlns:a16="http://schemas.microsoft.com/office/drawing/2014/main" id="{B826EC1D-ADB3-40C8-9BDF-B44BD50ABE16}"/>
               </a:ext>
             </a:extLst>
           </p:cNvPr>
@@ -23186,201 +24805,130 @@
         </p:nvSpPr>
         <p:spPr>
           <a:xfrm>
-            <a:off x="1024128" y="2435291"/>
-            <a:ext cx="9720073" cy="3508310"/>
+            <a:off x="732466" y="2249294"/>
+            <a:ext cx="9720073" cy="4023360"/>
           </a:xfrm>
         </p:spPr>
         <p:txBody>
-          <a:bodyPr>
-            <a:normAutofit fontScale="77500" lnSpcReduction="20000"/>
-          </a:bodyPr>
+          <a:bodyPr/>
           <a:lstStyle/>
           <a:p>
+            <a:pPr marL="0" indent="0">
+              <a:buNone/>
+            </a:pPr>
             <a:r>
-              <a:rPr lang="el-GR" sz="2600" dirty="0"/>
-              <a:t>Από τα εξής </a:t>
+              <a:rPr lang="el-GR" dirty="0"/>
+              <a:t>Όσον αφορά το δεύτερο ερώτημα της </a:t>
             </a:r>
             <a:r>
-              <a:rPr lang="en-US" sz="2600" dirty="0"/>
-              <a:t>link</a:t>
+              <a:rPr lang="el-GR" dirty="0" err="1"/>
+              <a:t>εργασίας,η</a:t>
             </a:r>
             <a:r>
-              <a:rPr lang="el-GR" sz="2600" dirty="0"/>
+              <a:rPr lang="el-GR" dirty="0"/>
+              <a:t> τοπολογία που δημιουργήθηκε είναι η εξής </a:t>
+            </a:r>
+            <a:r>
+              <a:rPr lang="en-US" dirty="0"/>
               <a:t>:</a:t>
             </a:r>
-            <a:br>
-              <a:rPr lang="en-US" dirty="0"/>
-            </a:br>
-            <a:br>
-              <a:rPr lang="en-US" sz="2600" dirty="0"/>
-            </a:br>
-            <a:r>
-              <a:rPr lang="en-US" sz="2600" dirty="0">
-                <a:solidFill>
-                  <a:schemeClr val="accent1">
-                    <a:lumMod val="75000"/>
-                  </a:schemeClr>
-                </a:solidFill>
-                <a:hlinkClick r:id="rId2">
-                  <a:extLst>
-                    <a:ext uri="{A12FA001-AC4F-418D-AE19-62706E023703}">
-                      <ahyp:hlinkClr xmlns:ahyp="http://schemas.microsoft.com/office/drawing/2018/hyperlinkcolor" val="tx"/>
-                    </a:ext>
-                  </a:extLst>
-                </a:hlinkClick>
-              </a:rPr>
-              <a:t>https://www.nsnam.org/documentation/</a:t>
-            </a:r>
-            <a:endParaRPr lang="el-GR" sz="2600" dirty="0">
-              <a:solidFill>
-                <a:schemeClr val="accent1">
-                  <a:lumMod val="75000"/>
-                </a:schemeClr>
-              </a:solidFill>
-            </a:endParaRPr>
           </a:p>
           <a:p>
-            <a:r>
-              <a:rPr lang="en-US" sz="2600" dirty="0">
-                <a:solidFill>
-                  <a:schemeClr val="accent1">
-                    <a:lumMod val="75000"/>
-                  </a:schemeClr>
-                </a:solidFill>
-                <a:hlinkClick r:id="rId3">
-                  <a:extLst>
-                    <a:ext uri="{A12FA001-AC4F-418D-AE19-62706E023703}">
-                      <ahyp:hlinkClr xmlns:ahyp="http://schemas.microsoft.com/office/drawing/2018/hyperlinkcolor" val="tx"/>
-                    </a:ext>
-                  </a:extLst>
-                </a:hlinkClick>
-              </a:rPr>
-              <a:t>https://www.nsnam.org/docs/contributing/html/coding-style.html#header-file-includes</a:t>
-            </a:r>
-            <a:endParaRPr lang="el-GR" sz="2600" dirty="0">
-              <a:solidFill>
-                <a:schemeClr val="accent1">
-                  <a:lumMod val="75000"/>
-                </a:schemeClr>
-              </a:solidFill>
-            </a:endParaRPr>
+            <a:pPr marL="0" indent="0">
+              <a:buNone/>
+            </a:pPr>
+            <a:endParaRPr lang="en-US" dirty="0"/>
           </a:p>
           <a:p>
-            <a:r>
-              <a:rPr lang="en-US" sz="2600" dirty="0">
-                <a:solidFill>
-                  <a:schemeClr val="accent1">
-                    <a:lumMod val="75000"/>
-                  </a:schemeClr>
-                </a:solidFill>
-                <a:hlinkClick r:id="rId4">
-                  <a:extLst>
-                    <a:ext uri="{A12FA001-AC4F-418D-AE19-62706E023703}">
-                      <ahyp:hlinkClr xmlns:ahyp="http://schemas.microsoft.com/office/drawing/2018/hyperlinkcolor" val="tx"/>
-                    </a:ext>
-                  </a:extLst>
-                </a:hlinkClick>
-              </a:rPr>
-              <a:t>https://www.nsnam.org/docs/tutorial/html/</a:t>
-            </a:r>
-            <a:endParaRPr lang="en-US" sz="2600" dirty="0">
-              <a:solidFill>
-                <a:schemeClr val="accent1">
-                  <a:lumMod val="75000"/>
-                </a:schemeClr>
-              </a:solidFill>
-            </a:endParaRPr>
+            <a:pPr marL="0" indent="0">
+              <a:buNone/>
+            </a:pPr>
+            <a:endParaRPr lang="en-US" dirty="0"/>
           </a:p>
           <a:p>
-            <a:r>
-              <a:rPr lang="en-US" sz="2600" dirty="0">
-                <a:solidFill>
-                  <a:schemeClr val="accent1">
-                    <a:lumMod val="75000"/>
-                  </a:schemeClr>
-                </a:solidFill>
-                <a:hlinkClick r:id="rId5">
-                  <a:extLst>
-                    <a:ext uri="{A12FA001-AC4F-418D-AE19-62706E023703}">
-                      <ahyp:hlinkClr xmlns:ahyp="http://schemas.microsoft.com/office/drawing/2018/hyperlinkcolor" val="tx"/>
-                    </a:ext>
-                  </a:extLst>
-                </a:hlinkClick>
-              </a:rPr>
-              <a:t>https://www.youtube.com/watch?v=Jv_swgcykjQ</a:t>
-            </a:r>
-            <a:endParaRPr lang="en-US" sz="2600" dirty="0">
-              <a:solidFill>
-                <a:schemeClr val="accent1">
-                  <a:lumMod val="75000"/>
-                </a:schemeClr>
-              </a:solidFill>
-            </a:endParaRPr>
-          </a:p>
-          <a:p>
-            <a:r>
-              <a:rPr lang="en-US" sz="2600" dirty="0">
-                <a:solidFill>
-                  <a:schemeClr val="accent1">
-                    <a:lumMod val="75000"/>
-                  </a:schemeClr>
-                </a:solidFill>
-                <a:hlinkClick r:id="rId6">
-                  <a:extLst>
-                    <a:ext uri="{A12FA001-AC4F-418D-AE19-62706E023703}">
-                      <ahyp:hlinkClr xmlns:ahyp="http://schemas.microsoft.com/office/drawing/2018/hyperlinkcolor" val="tx"/>
-                    </a:ext>
-                  </a:extLst>
-                </a:hlinkClick>
-              </a:rPr>
-              <a:t>https://www.youtube.com/watch?v=2W5mdzQrwXI</a:t>
-            </a:r>
-            <a:endParaRPr lang="en-US" sz="2600" dirty="0">
-              <a:solidFill>
-                <a:schemeClr val="accent1">
-                  <a:lumMod val="75000"/>
-                </a:schemeClr>
-              </a:solidFill>
-            </a:endParaRPr>
-          </a:p>
-          <a:p>
-            <a:r>
-              <a:rPr lang="en-US" sz="2600" dirty="0">
-                <a:solidFill>
-                  <a:schemeClr val="accent1">
-                    <a:lumMod val="75000"/>
-                  </a:schemeClr>
-                </a:solidFill>
-                <a:hlinkClick r:id="rId7">
-                  <a:extLst>
-                    <a:ext uri="{A12FA001-AC4F-418D-AE19-62706E023703}">
-                      <ahyp:hlinkClr xmlns:ahyp="http://schemas.microsoft.com/office/drawing/2018/hyperlinkcolor" val="tx"/>
-                    </a:ext>
-                  </a:extLst>
-                </a:hlinkClick>
-              </a:rPr>
-              <a:t>https://www.nsnam.org/docs/tutorial/html/building-topologies.html</a:t>
-            </a:r>
-            <a:endParaRPr lang="en-US" sz="2600" dirty="0">
-              <a:solidFill>
-                <a:schemeClr val="accent1">
-                  <a:lumMod val="75000"/>
-                </a:schemeClr>
-              </a:solidFill>
-            </a:endParaRPr>
-          </a:p>
-          <a:p>
-            <a:br>
-              <a:rPr lang="en-US" dirty="0"/>
-            </a:br>
             <a:endParaRPr lang="el-GR" dirty="0"/>
           </a:p>
         </p:txBody>
       </p:sp>
+      <p:sp>
+        <p:nvSpPr>
+          <p:cNvPr id="5" name="AutoShape 4" descr="image.png">
+            <a:extLst>
+              <a:ext uri="{FF2B5EF4-FFF2-40B4-BE49-F238E27FC236}">
+                <a16:creationId xmlns:a16="http://schemas.microsoft.com/office/drawing/2014/main" id="{9EC8DA17-04F4-4836-B00D-8C2179B2E7C4}"/>
+              </a:ext>
+            </a:extLst>
+          </p:cNvPr>
+          <p:cNvSpPr>
+            <a:spLocks noChangeAspect="1" noChangeArrowheads="1"/>
+          </p:cNvSpPr>
+          <p:nvPr/>
+        </p:nvSpPr>
+        <p:spPr bwMode="auto">
+          <a:xfrm>
+            <a:off x="5943600" y="3276600"/>
+            <a:ext cx="304800" cy="304800"/>
+          </a:xfrm>
+          <a:prstGeom prst="rect">
+            <a:avLst/>
+          </a:prstGeom>
+          <a:noFill/>
+          <a:extLst>
+            <a:ext uri="{909E8E84-426E-40DD-AFC4-6F175D3DCCD1}">
+              <a14:hiddenFill xmlns:a14="http://schemas.microsoft.com/office/drawing/2010/main">
+                <a:solidFill>
+                  <a:srgbClr val="FFFFFF"/>
+                </a:solidFill>
+              </a14:hiddenFill>
+            </a:ext>
+          </a:extLst>
+        </p:spPr>
+        <p:txBody>
+          <a:bodyPr vert="horz" wrap="square" lIns="91440" tIns="45720" rIns="91440" bIns="45720" numCol="1" anchor="t" anchorCtr="0" compatLnSpc="1">
+            <a:prstTxWarp prst="textNoShape">
+              <a:avLst/>
+            </a:prstTxWarp>
+          </a:bodyPr>
+          <a:lstStyle/>
+          <a:p>
+            <a:endParaRPr lang="el-GR"/>
+          </a:p>
+        </p:txBody>
+      </p:sp>
+      <p:pic>
+        <p:nvPicPr>
+          <p:cNvPr id="6" name="Εικόνα 5">
+            <a:extLst>
+              <a:ext uri="{FF2B5EF4-FFF2-40B4-BE49-F238E27FC236}">
+                <a16:creationId xmlns:a16="http://schemas.microsoft.com/office/drawing/2014/main" id="{9107478B-F89B-47FA-B8F9-EAC2BCD55F50}"/>
+              </a:ext>
+            </a:extLst>
+          </p:cNvPr>
+          <p:cNvPicPr>
+            <a:picLocks noChangeAspect="1"/>
+          </p:cNvPicPr>
+          <p:nvPr/>
+        </p:nvPicPr>
+        <p:blipFill>
+          <a:blip r:embed="rId2"/>
+          <a:stretch>
+            <a:fillRect/>
+          </a:stretch>
+        </p:blipFill>
+        <p:spPr>
+          <a:xfrm>
+            <a:off x="732466" y="3003954"/>
+            <a:ext cx="3476927" cy="3247679"/>
+          </a:xfrm>
+          <a:prstGeom prst="rect">
+            <a:avLst/>
+          </a:prstGeom>
+        </p:spPr>
+      </p:pic>
     </p:spTree>
     <p:extLst>
       <p:ext uri="{BB962C8B-B14F-4D97-AF65-F5344CB8AC3E}">
-        <p14:creationId xmlns:p14="http://schemas.microsoft.com/office/powerpoint/2010/main" val="1234120531"/>
+        <p14:creationId xmlns:p14="http://schemas.microsoft.com/office/powerpoint/2010/main" val="567458805"/>
       </p:ext>
     </p:extLst>
   </p:cSld>
@@ -24218,23 +25766,6 @@
 </file>
 
 <file path=customXml/item1.xml><?xml version="1.0" encoding="utf-8"?>
-<p:properties xmlns:p="http://schemas.microsoft.com/office/2006/metadata/properties" xmlns:xsi="http://www.w3.org/2001/XMLSchema-instance" xmlns:pc="http://schemas.microsoft.com/office/infopath/2007/PartnerControls">
-  <documentManagement>
-    <MediaServiceKeyPoints xmlns="71af3243-3dd4-4a8d-8c0d-dd76da1f02a5" xsi:nil="true"/>
-  </documentManagement>
-</p:properties>
-</file>
-
-<file path=customXml/item2.xml><?xml version="1.0" encoding="utf-8"?>
-<?mso-contentType ?>
-<FormTemplates xmlns="http://schemas.microsoft.com/sharepoint/v3/contenttype/forms">
-  <Display>DocumentLibraryForm</Display>
-  <Edit>DocumentLibraryForm</Edit>
-  <New>DocumentLibraryForm</New>
-</FormTemplates>
-</file>
-
-<file path=customXml/item3.xml><?xml version="1.0" encoding="utf-8"?>
 <ct:contentTypeSchema xmlns:ct="http://schemas.microsoft.com/office/2006/metadata/contentType" xmlns:ma="http://schemas.microsoft.com/office/2006/metadata/properties/metaAttributes" ct:_="" ma:_="" ma:contentTypeName="Document" ma:contentTypeID="0x01010079F111ED35F8CC479449609E8A0923A6" ma:contentTypeVersion="11" ma:contentTypeDescription="Create a new document." ma:contentTypeScope="" ma:versionID="9677210f24a1be23c92c90fd886aa0aa">
   <xsd:schema xmlns:xsd="http://www.w3.org/2001/XMLSchema" xmlns:xs="http://www.w3.org/2001/XMLSchema" xmlns:p="http://schemas.microsoft.com/office/2006/metadata/properties" xmlns:ns2="71af3243-3dd4-4a8d-8c0d-dd76da1f02a5" xmlns:ns3="16c05727-aa75-4e4a-9b5f-8a80a1165891" targetNamespace="http://schemas.microsoft.com/office/2006/metadata/properties" ma:root="true" ma:fieldsID="60e05723c5c1908df1a1a4ebf11d344e" ns2:_="" ns3:_="">
     <xsd:import namespace="71af3243-3dd4-4a8d-8c0d-dd76da1f02a5"/>
@@ -24445,25 +25976,24 @@
 </ct:contentTypeSchema>
 </file>
 
-<file path=customXml/itemProps1.xml><?xml version="1.0" encoding="utf-8"?>
-<ds:datastoreItem xmlns:ds="http://schemas.openxmlformats.org/officeDocument/2006/customXml" ds:itemID="{788A2F88-55C5-4ED1-9541-807C65424763}">
-  <ds:schemaRefs>
-    <ds:schemaRef ds:uri="http://schemas.microsoft.com/office/2006/metadata/properties"/>
-    <ds:schemaRef ds:uri="http://schemas.microsoft.com/office/infopath/2007/PartnerControls"/>
-    <ds:schemaRef ds:uri="71af3243-3dd4-4a8d-8c0d-dd76da1f02a5"/>
-  </ds:schemaRefs>
-</ds:datastoreItem>
+<file path=customXml/item2.xml><?xml version="1.0" encoding="utf-8"?>
+<?mso-contentType ?>
+<FormTemplates xmlns="http://schemas.microsoft.com/sharepoint/v3/contenttype/forms">
+  <Display>DocumentLibraryForm</Display>
+  <Edit>DocumentLibraryForm</Edit>
+  <New>DocumentLibraryForm</New>
+</FormTemplates>
 </file>
 
-<file path=customXml/itemProps2.xml><?xml version="1.0" encoding="utf-8"?>
-<ds:datastoreItem xmlns:ds="http://schemas.openxmlformats.org/officeDocument/2006/customXml" ds:itemID="{4F44C90D-2A62-4985-9618-3460247437B1}">
-  <ds:schemaRefs>
-    <ds:schemaRef ds:uri="http://schemas.microsoft.com/sharepoint/v3/contenttype/forms"/>
-  </ds:schemaRefs>
-</ds:datastoreItem>
+<file path=customXml/item3.xml><?xml version="1.0" encoding="utf-8"?>
+<p:properties xmlns:p="http://schemas.microsoft.com/office/2006/metadata/properties" xmlns:xsi="http://www.w3.org/2001/XMLSchema-instance" xmlns:pc="http://schemas.microsoft.com/office/infopath/2007/PartnerControls">
+  <documentManagement>
+    <MediaServiceKeyPoints xmlns="71af3243-3dd4-4a8d-8c0d-dd76da1f02a5" xsi:nil="true"/>
+  </documentManagement>
+</p:properties>
 </file>
 
-<file path=customXml/itemProps3.xml><?xml version="1.0" encoding="utf-8"?>
+<file path=customXml/itemProps1.xml><?xml version="1.0" encoding="utf-8"?>
 <ds:datastoreItem xmlns:ds="http://schemas.openxmlformats.org/officeDocument/2006/customXml" ds:itemID="{B61EAB5F-88FC-4FAE-AE3C-037A3C365EB8}">
   <ds:schemaRefs>
     <ds:schemaRef ds:uri="http://schemas.microsoft.com/office/2006/metadata/contentType"/>
@@ -24480,4 +26010,29 @@
     <ds:schemaRef ds:uri="http://schemas.microsoft.com/internal/obd"/>
   </ds:schemaRefs>
 </ds:datastoreItem>
+</file>
+
+<file path=customXml/itemProps2.xml><?xml version="1.0" encoding="utf-8"?>
+<ds:datastoreItem xmlns:ds="http://schemas.openxmlformats.org/officeDocument/2006/customXml" ds:itemID="{4F44C90D-2A62-4985-9618-3460247437B1}">
+  <ds:schemaRefs>
+    <ds:schemaRef ds:uri="http://schemas.microsoft.com/sharepoint/v3/contenttype/forms"/>
+  </ds:schemaRefs>
+</ds:datastoreItem>
+</file>
+
+<file path=customXml/itemProps3.xml><?xml version="1.0" encoding="utf-8"?>
+<ds:datastoreItem xmlns:ds="http://schemas.openxmlformats.org/officeDocument/2006/customXml" ds:itemID="{788A2F88-55C5-4ED1-9541-807C65424763}">
+  <ds:schemaRefs>
+    <ds:schemaRef ds:uri="16c05727-aa75-4e4a-9b5f-8a80a1165891"/>
+    <ds:schemaRef ds:uri="http://www.w3.org/XML/1998/namespace"/>
+    <ds:schemaRef ds:uri="http://purl.org/dc/terms/"/>
+    <ds:schemaRef ds:uri="http://purl.org/dc/elements/1.1/"/>
+    <ds:schemaRef ds:uri="http://purl.org/dc/dcmitype/"/>
+    <ds:schemaRef ds:uri="http://schemas.microsoft.com/office/infopath/2007/PartnerControls"/>
+    <ds:schemaRef ds:uri="http://schemas.microsoft.com/office/2006/documentManagement/types"/>
+    <ds:schemaRef ds:uri="http://schemas.openxmlformats.org/package/2006/metadata/core-properties"/>
+    <ds:schemaRef ds:uri="71af3243-3dd4-4a8d-8c0d-dd76da1f02a5"/>
+    <ds:schemaRef ds:uri="http://schemas.microsoft.com/office/2006/metadata/properties"/>
+  </ds:schemaRefs>
+</ds:datastoreItem>
 </file>
</xml_diff>

<commit_message>
Made some of my changes!
</commit_message>
<xml_diff>
--- a/Presentations/Ns-3_presentation_F.pptx
+++ b/Presentations/Ns-3_presentation_F.pptx
@@ -5,10 +5,10 @@
     <p:sldMasterId id="2147483648" r:id="rId4"/>
   </p:sldMasterIdLst>
   <p:notesMasterIdLst>
-    <p:notesMasterId r:id="rId19"/>
+    <p:notesMasterId r:id="rId20"/>
   </p:notesMasterIdLst>
   <p:handoutMasterIdLst>
-    <p:handoutMasterId r:id="rId20"/>
+    <p:handoutMasterId r:id="rId21"/>
   </p:handoutMasterIdLst>
   <p:sldIdLst>
     <p:sldId id="256" r:id="rId5"/>
@@ -22,9 +22,10 @@
     <p:sldId id="287" r:id="rId13"/>
     <p:sldId id="293" r:id="rId14"/>
     <p:sldId id="294" r:id="rId15"/>
-    <p:sldId id="295" r:id="rId16"/>
-    <p:sldId id="288" r:id="rId17"/>
-    <p:sldId id="281" r:id="rId18"/>
+    <p:sldId id="296" r:id="rId16"/>
+    <p:sldId id="295" r:id="rId17"/>
+    <p:sldId id="288" r:id="rId18"/>
+    <p:sldId id="281" r:id="rId19"/>
   </p:sldIdLst>
   <p:sldSz cx="12192000" cy="6858000"/>
   <p:notesSz cx="6858000" cy="9144000"/>
@@ -218,7 +219,7 @@
             <a:pPr rtl="0"/>
             <a:fld id="{F0EC7D35-77BB-4867-BAC6-5C40C37B98F1}" type="datetime1">
               <a:rPr lang="el-GR" smtClean="0"/>
-              <a:t>18/11/2025</a:t>
+              <a:t>19/11/2025</a:t>
             </a:fld>
             <a:endParaRPr lang="el-GR" dirty="0"/>
           </a:p>
@@ -388,7 +389,7 @@
             <a:pPr rtl="0"/>
             <a:fld id="{707ABAE7-72BE-4378-9C66-B300388DE536}" type="datetime1">
               <a:rPr lang="el-GR" noProof="0" smtClean="0"/>
-              <a:t>18/11/2025</a:t>
+              <a:t>19/11/2025</a:t>
             </a:fld>
             <a:endParaRPr lang="el-GR" noProof="0" dirty="0"/>
           </a:p>
@@ -691,7 +692,7 @@
           <a:bodyPr/>
           <a:lstStyle/>
           <a:p>
-            <a:endParaRPr lang="en-GB"/>
+            <a:endParaRPr lang="en-GB" dirty="0"/>
           </a:p>
         </p:txBody>
       </p:sp>
@@ -784,7 +785,7 @@
           <a:bodyPr/>
           <a:lstStyle/>
           <a:p>
-            <a:endParaRPr lang="en-GB"/>
+            <a:endParaRPr lang="en-GB" dirty="0"/>
           </a:p>
         </p:txBody>
       </p:sp>
@@ -905,7 +906,7 @@
           <a:bodyPr/>
           <a:lstStyle/>
           <a:p>
-            <a:endParaRPr lang="en-GB"/>
+            <a:endParaRPr lang="en-GB" dirty="0"/>
           </a:p>
         </p:txBody>
       </p:sp>
@@ -9513,7 +9514,7 @@
           <a:bodyPr/>
           <a:lstStyle/>
           <a:p>
-            <a:endParaRPr lang="en-GB"/>
+            <a:endParaRPr lang="en-GB" dirty="0"/>
           </a:p>
         </p:txBody>
       </p:sp>
@@ -9654,7 +9655,7 @@
             <a:pPr rtl="0"/>
             <a:fld id="{EABDBA74-E4DB-4313-95D3-B7F630EE7B7F}" type="datetime1">
               <a:rPr lang="el-GR" noProof="0" smtClean="0"/>
-              <a:t>18/11/2025</a:t>
+              <a:t>19/11/2025</a:t>
             </a:fld>
             <a:endParaRPr lang="el-GR" noProof="0" dirty="0"/>
           </a:p>
@@ -9863,7 +9864,7 @@
             <a:pPr rtl="0"/>
             <a:fld id="{D9C97E28-F60A-427B-851A-BCC048F06BC7}" type="datetime1">
               <a:rPr lang="el-GR" noProof="0" smtClean="0"/>
-              <a:t>18/11/2025</a:t>
+              <a:t>19/11/2025</a:t>
             </a:fld>
             <a:endParaRPr lang="el-GR" noProof="0" dirty="0"/>
           </a:p>
@@ -10045,7 +10046,7 @@
             <a:pPr rtl="0"/>
             <a:fld id="{4EA33EDB-81C3-4DAA-87EA-DA21D6A7FC6C}" type="datetime1">
               <a:rPr lang="el-GR" noProof="0" smtClean="0"/>
-              <a:t>18/11/2025</a:t>
+              <a:t>19/11/2025</a:t>
             </a:fld>
             <a:endParaRPr lang="el-GR" noProof="0" dirty="0"/>
           </a:p>
@@ -10252,7 +10253,7 @@
             <a:pPr rtl="0"/>
             <a:fld id="{0FE5ACA5-56F5-4208-8101-108DA68822C6}" type="datetime1">
               <a:rPr lang="el-GR" noProof="0" smtClean="0"/>
-              <a:t>18/11/2025</a:t>
+              <a:t>19/11/2025</a:t>
             </a:fld>
             <a:endParaRPr lang="el-GR" noProof="0" dirty="0"/>
           </a:p>
@@ -10373,7 +10374,7 @@
           <a:bodyPr/>
           <a:lstStyle/>
           <a:p>
-            <a:endParaRPr lang="en-GB"/>
+            <a:endParaRPr lang="en-GB" dirty="0"/>
           </a:p>
         </p:txBody>
       </p:sp>
@@ -18981,7 +18982,7 @@
           <a:bodyPr/>
           <a:lstStyle/>
           <a:p>
-            <a:endParaRPr lang="en-GB"/>
+            <a:endParaRPr lang="en-GB" dirty="0"/>
           </a:p>
         </p:txBody>
       </p:sp>
@@ -19166,7 +19167,7 @@
             <a:pPr rtl="0"/>
             <a:fld id="{98AAE694-814A-4F58-A8E2-AA9B6575E0B5}" type="datetime1">
               <a:rPr lang="el-GR" noProof="0" smtClean="0"/>
-              <a:t>18/11/2025</a:t>
+              <a:t>19/11/2025</a:t>
             </a:fld>
             <a:endParaRPr lang="el-GR" noProof="0" dirty="0"/>
           </a:p>
@@ -19442,7 +19443,7 @@
             <a:pPr rtl="0"/>
             <a:fld id="{98B30D4A-F623-45A5-BE49-543B4B609AF2}" type="datetime1">
               <a:rPr lang="el-GR" noProof="0" smtClean="0"/>
-              <a:t>18/11/2025</a:t>
+              <a:t>19/11/2025</a:t>
             </a:fld>
             <a:endParaRPr lang="el-GR" noProof="0" dirty="0"/>
           </a:p>
@@ -19842,7 +19843,7 @@
             <a:pPr rtl="0"/>
             <a:fld id="{06412F62-D18F-463A-9A7E-E4809AAD76E4}" type="datetime1">
               <a:rPr lang="el-GR" noProof="0" smtClean="0"/>
-              <a:t>18/11/2025</a:t>
+              <a:t>19/11/2025</a:t>
             </a:fld>
             <a:endParaRPr lang="el-GR" noProof="0" dirty="0"/>
           </a:p>
@@ -19962,7 +19963,7 @@
             <a:pPr rtl="0"/>
             <a:fld id="{D2009D47-CF8A-48CB-81B8-5988DBFADA28}" type="datetime1">
               <a:rPr lang="el-GR" noProof="0" smtClean="0"/>
-              <a:t>18/11/2025</a:t>
+              <a:t>19/11/2025</a:t>
             </a:fld>
             <a:endParaRPr lang="el-GR" noProof="0" dirty="0"/>
           </a:p>
@@ -20058,7 +20059,7 @@
             <a:pPr rtl="0"/>
             <a:fld id="{89B075A6-4B0E-489A-92E5-C2C81D969D11}" type="datetime1">
               <a:rPr lang="el-GR" noProof="0" smtClean="0"/>
-              <a:t>18/11/2025</a:t>
+              <a:t>19/11/2025</a:t>
             </a:fld>
             <a:endParaRPr lang="el-GR" noProof="0" dirty="0"/>
           </a:p>
@@ -20350,7 +20351,7 @@
             <a:pPr rtl="0"/>
             <a:fld id="{7C290451-C354-46E0-BBD8-0317D7A1384C}" type="datetime1">
               <a:rPr lang="el-GR" noProof="0" smtClean="0"/>
-              <a:t>18/11/2025</a:t>
+              <a:t>19/11/2025</a:t>
             </a:fld>
             <a:endParaRPr lang="el-GR" noProof="0" dirty="0"/>
           </a:p>
@@ -20528,10 +20529,9 @@
           <a:p>
             <a:pPr rtl="0"/>
             <a:r>
-              <a:rPr lang="el-GR" noProof="0"/>
+              <a:rPr lang="el-GR" noProof="0" dirty="0"/>
               <a:t>Κάντε κλικ στο εικονίδιο για να προσθέσετε εικόνα</a:t>
             </a:r>
-            <a:endParaRPr lang="el-GR" noProof="0" dirty="0"/>
           </a:p>
         </p:txBody>
       </p:sp>
@@ -20633,7 +20633,7 @@
             <a:pPr rtl="0"/>
             <a:fld id="{05DAA40D-D363-46A0-9276-B6A4797DC9A5}" type="datetime1">
               <a:rPr lang="el-GR" noProof="0" smtClean="0"/>
-              <a:t>18/11/2025</a:t>
+              <a:t>19/11/2025</a:t>
             </a:fld>
             <a:endParaRPr lang="el-GR" noProof="0" dirty="0"/>
           </a:p>
@@ -20882,7 +20882,7 @@
           <a:p>
             <a:fld id="{F98FDC76-A1F5-4EE8-BDE3-5EFC56AAE7AD}" type="datetime1">
               <a:rPr lang="el-GR" noProof="0" smtClean="0"/>
-              <a:t>18/11/2025</a:t>
+              <a:t>19/11/2025</a:t>
             </a:fld>
             <a:endParaRPr lang="el-GR" noProof="0" dirty="0"/>
           </a:p>
@@ -22128,66 +22128,76 @@
         <p:spPr>
           <a:xfrm>
             <a:off x="1024126" y="2286000"/>
-            <a:ext cx="9050039" cy="961697"/>
+            <a:ext cx="9911352" cy="2416629"/>
           </a:xfrm>
         </p:spPr>
         <p:txBody>
           <a:bodyPr>
-            <a:normAutofit/>
+            <a:normAutofit lnSpcReduction="10000"/>
           </a:bodyPr>
           <a:lstStyle/>
           <a:p>
+            <a:pPr>
+              <a:buFont typeface="Arial" panose="020B0604020202020204" pitchFamily="34" charset="0"/>
+              <a:buChar char="•"/>
+            </a:pPr>
             <a:r>
               <a:rPr lang="el-GR" dirty="0"/>
               <a:t>Χρήση του </a:t>
             </a:r>
             <a:r>
               <a:rPr lang="en-US" dirty="0"/>
-              <a:t>warm-up phase!</a:t>
-            </a:r>
+              <a:t>warm-up phase</a:t>
+            </a:r>
+            <a:r>
+              <a:rPr lang="el-GR" dirty="0"/>
+              <a:t> στην περίπτωση αυτού του πειράματος δεν έχει κάποια παρατηρήσιμη διαφορά καθώς:</a:t>
+            </a:r>
+            <a:br>
+              <a:rPr lang="el-GR" dirty="0"/>
+            </a:br>
+            <a:r>
+              <a:rPr lang="el-GR" dirty="0"/>
+              <a:t>	</a:t>
+            </a:r>
+            <a:br>
+              <a:rPr lang="el-GR" dirty="0"/>
+            </a:br>
+            <a:r>
+              <a:rPr lang="el-GR" dirty="0"/>
+              <a:t>	Χρησιμοποιήσαμε το </a:t>
+            </a:r>
+            <a:r>
+              <a:rPr lang="en-GB" dirty="0"/>
+              <a:t>dynamic routing protocol OLSR </a:t>
+            </a:r>
+            <a:r>
+              <a:rPr lang="el-GR" dirty="0"/>
+              <a:t>που είναι αρκετά προβλεπτικό κάτι που σημαίνει ότι διατηρεί σε όλες τις χρονικές στιγμές τα </a:t>
+            </a:r>
+            <a:r>
+              <a:rPr lang="en-GB" dirty="0"/>
+              <a:t>routing tables</a:t>
+            </a:r>
+            <a:r>
+              <a:rPr lang="el-GR" dirty="0"/>
+              <a:t>. Επομένως, μπορεί να είναι και πιο γρήγορο και από το </a:t>
+            </a:r>
+            <a:r>
+              <a:rPr lang="en-GB" dirty="0"/>
+              <a:t>warm-up phase </a:t>
+            </a:r>
+            <a:r>
+              <a:rPr lang="el-GR" dirty="0"/>
+              <a:t>που έχουμε μοντελοποιήσει.</a:t>
+            </a:r>
+            <a:br>
+              <a:rPr lang="el-GR" dirty="0"/>
+            </a:br>
             <a:endParaRPr lang="el-GR" dirty="0"/>
           </a:p>
           <a:p>
             <a:endParaRPr lang="en-US" dirty="0"/>
-          </a:p>
-        </p:txBody>
-      </p:sp>
-      <p:sp>
-        <p:nvSpPr>
-          <p:cNvPr id="4" name="TextBox 3">
-            <a:extLst>
-              <a:ext uri="{FF2B5EF4-FFF2-40B4-BE49-F238E27FC236}">
-                <a16:creationId xmlns:a16="http://schemas.microsoft.com/office/drawing/2014/main" id="{A9C8366C-622C-7125-D484-05F4642D4D20}"/>
-              </a:ext>
-            </a:extLst>
-          </p:cNvPr>
-          <p:cNvSpPr txBox="1"/>
-          <p:nvPr/>
-        </p:nvSpPr>
-        <p:spPr>
-          <a:xfrm>
-            <a:off x="3288494" y="4244195"/>
-            <a:ext cx="5615013" cy="1446550"/>
-          </a:xfrm>
-          <a:prstGeom prst="rect">
-            <a:avLst/>
-          </a:prstGeom>
-          <a:noFill/>
-        </p:spPr>
-        <p:txBody>
-          <a:bodyPr wrap="square" rtlCol="0">
-            <a:spAutoFit/>
-          </a:bodyPr>
-          <a:lstStyle/>
-          <a:p>
-            <a:r>
-              <a:rPr lang="en-US" sz="4400" dirty="0"/>
-              <a:t>Screen shot for showing what we have done</a:t>
-            </a:r>
-            <a:r>
-              <a:rPr lang="en-US" dirty="0"/>
-              <a:t>!</a:t>
-            </a:r>
           </a:p>
         </p:txBody>
       </p:sp>
@@ -22208,6 +22218,233 @@
 </file>
 
 <file path=ppt/slides/slide12.xml><?xml version="1.0" encoding="utf-8"?>
+<p:sld xmlns:a="http://schemas.openxmlformats.org/drawingml/2006/main" xmlns:r="http://schemas.openxmlformats.org/officeDocument/2006/relationships" xmlns:p="http://schemas.openxmlformats.org/presentationml/2006/main">
+  <p:cSld>
+    <p:spTree>
+      <p:nvGrpSpPr>
+        <p:cNvPr id="1" name="">
+          <a:extLst>
+            <a:ext uri="{FF2B5EF4-FFF2-40B4-BE49-F238E27FC236}">
+              <a16:creationId xmlns:a16="http://schemas.microsoft.com/office/drawing/2014/main" id="{F90D5640-9372-6295-0129-9341889539ED}"/>
+            </a:ext>
+          </a:extLst>
+        </p:cNvPr>
+        <p:cNvGrpSpPr/>
+        <p:nvPr/>
+      </p:nvGrpSpPr>
+      <p:grpSpPr>
+        <a:xfrm>
+          <a:off x="0" y="0"/>
+          <a:ext cx="0" cy="0"/>
+          <a:chOff x="0" y="0"/>
+          <a:chExt cx="0" cy="0"/>
+        </a:xfrm>
+      </p:grpSpPr>
+      <p:sp>
+        <p:nvSpPr>
+          <p:cNvPr id="2" name="Τίτλος 1">
+            <a:extLst>
+              <a:ext uri="{FF2B5EF4-FFF2-40B4-BE49-F238E27FC236}">
+                <a16:creationId xmlns:a16="http://schemas.microsoft.com/office/drawing/2014/main" id="{750BF758-34A8-6D30-B8A4-7E1FA62812F1}"/>
+              </a:ext>
+            </a:extLst>
+          </p:cNvPr>
+          <p:cNvSpPr>
+            <a:spLocks noGrp="1"/>
+          </p:cNvSpPr>
+          <p:nvPr>
+            <p:ph type="title"/>
+          </p:nvPr>
+        </p:nvSpPr>
+        <p:spPr>
+          <a:xfrm>
+            <a:off x="817940" y="585741"/>
+            <a:ext cx="11167872" cy="1499616"/>
+          </a:xfrm>
+        </p:spPr>
+        <p:txBody>
+          <a:bodyPr/>
+          <a:lstStyle/>
+          <a:p>
+            <a:r>
+              <a:rPr lang="el-GR" b="1"/>
+              <a:t>ΑΠΟΤΕΛΕΣΜΑΤΑ ΤΟΥ ΕΡΩΤΗΜΑΤΟΣ 2(</a:t>
+            </a:r>
+            <a:r>
+              <a:rPr lang="en-US" b="1"/>
+              <a:t>3</a:t>
+            </a:r>
+            <a:r>
+              <a:rPr lang="el-GR" b="1"/>
+              <a:t>)</a:t>
+            </a:r>
+            <a:endParaRPr lang="el-GR" dirty="0"/>
+          </a:p>
+        </p:txBody>
+      </p:sp>
+      <p:sp>
+        <p:nvSpPr>
+          <p:cNvPr id="7" name="TextBox 6">
+            <a:extLst>
+              <a:ext uri="{FF2B5EF4-FFF2-40B4-BE49-F238E27FC236}">
+                <a16:creationId xmlns:a16="http://schemas.microsoft.com/office/drawing/2014/main" id="{448F07E5-1358-7F75-A65F-7BBD09729022}"/>
+              </a:ext>
+            </a:extLst>
+          </p:cNvPr>
+          <p:cNvSpPr txBox="1"/>
+          <p:nvPr/>
+        </p:nvSpPr>
+        <p:spPr>
+          <a:xfrm>
+            <a:off x="9092008" y="2846925"/>
+            <a:ext cx="3211959" cy="3139321"/>
+          </a:xfrm>
+          <a:prstGeom prst="rect">
+            <a:avLst/>
+          </a:prstGeom>
+          <a:noFill/>
+        </p:spPr>
+        <p:txBody>
+          <a:bodyPr wrap="square" rtlCol="0">
+            <a:spAutoFit/>
+          </a:bodyPr>
+          <a:lstStyle/>
+          <a:p>
+            <a:pPr marL="285750" indent="-285750">
+              <a:buFont typeface="Arial" panose="020B0604020202020204" pitchFamily="34" charset="0"/>
+              <a:buChar char="•"/>
+            </a:pPr>
+            <a:r>
+              <a:rPr lang="el-GR" dirty="0"/>
+              <a:t>Γίνεται χρήση του </a:t>
+            </a:r>
+            <a:r>
+              <a:rPr lang="en-US" dirty="0"/>
+              <a:t>Warm-up phase VS </a:t>
+            </a:r>
+            <a:r>
+              <a:rPr lang="el-GR" dirty="0"/>
+              <a:t>Μη-χρήση</a:t>
+            </a:r>
+            <a:br>
+              <a:rPr lang="el-GR" dirty="0"/>
+            </a:br>
+            <a:r>
+              <a:rPr lang="en-US" dirty="0"/>
+              <a:t>Warm-up phase.</a:t>
+            </a:r>
+            <a:br>
+              <a:rPr lang="el-GR" dirty="0"/>
+            </a:br>
+            <a:r>
+              <a:rPr lang="el-GR" dirty="0"/>
+              <a:t>με τις αντίστοιχες τιμές:</a:t>
+            </a:r>
+            <a:br>
+              <a:rPr lang="en-US" dirty="0"/>
+            </a:br>
+            <a:r>
+              <a:rPr lang="en-US" dirty="0"/>
+              <a:t> 	</a:t>
+            </a:r>
+            <a:r>
+              <a:rPr lang="el-GR" dirty="0"/>
+              <a:t>(Παρατηρούμε για τους λόγους που προαναφέραμε ότι δεν υπάρχει διαφορά </a:t>
+            </a:r>
+            <a:br>
+              <a:rPr lang="el-GR" dirty="0"/>
+            </a:br>
+            <a:r>
+              <a:rPr lang="el-GR" dirty="0"/>
+              <a:t>ανάμεσα στις 2 περιπτώσεις.)</a:t>
+            </a:r>
+            <a:endParaRPr lang="en-GB" dirty="0"/>
+          </a:p>
+          <a:p>
+            <a:br>
+              <a:rPr lang="el-GR" dirty="0"/>
+            </a:br>
+            <a:endParaRPr lang="en-GB" dirty="0"/>
+          </a:p>
+        </p:txBody>
+      </p:sp>
+      <p:pic>
+        <p:nvPicPr>
+          <p:cNvPr id="4" name="Picture 3" descr="A screenshot of a computer&#10;&#10;AI-generated content may be incorrect.">
+            <a:extLst>
+              <a:ext uri="{FF2B5EF4-FFF2-40B4-BE49-F238E27FC236}">
+                <a16:creationId xmlns:a16="http://schemas.microsoft.com/office/drawing/2014/main" id="{61989FDD-4629-A9A9-4EC3-158B14382847}"/>
+              </a:ext>
+            </a:extLst>
+          </p:cNvPr>
+          <p:cNvPicPr>
+            <a:picLocks noChangeAspect="1"/>
+          </p:cNvPicPr>
+          <p:nvPr/>
+        </p:nvPicPr>
+        <p:blipFill>
+          <a:blip r:embed="rId2"/>
+          <a:stretch>
+            <a:fillRect/>
+          </a:stretch>
+        </p:blipFill>
+        <p:spPr>
+          <a:xfrm>
+            <a:off x="355716" y="2240958"/>
+            <a:ext cx="4193399" cy="4519100"/>
+          </a:xfrm>
+          <a:prstGeom prst="rect">
+            <a:avLst/>
+          </a:prstGeom>
+        </p:spPr>
+      </p:pic>
+      <p:pic>
+        <p:nvPicPr>
+          <p:cNvPr id="6" name="Picture 5" descr="A screenshot of a computer program&#10;&#10;AI-generated content may be incorrect.">
+            <a:extLst>
+              <a:ext uri="{FF2B5EF4-FFF2-40B4-BE49-F238E27FC236}">
+                <a16:creationId xmlns:a16="http://schemas.microsoft.com/office/drawing/2014/main" id="{664F6319-ACE9-D792-D47C-DBE5678E464B}"/>
+              </a:ext>
+            </a:extLst>
+          </p:cNvPr>
+          <p:cNvPicPr>
+            <a:picLocks noChangeAspect="1"/>
+          </p:cNvPicPr>
+          <p:nvPr/>
+        </p:nvPicPr>
+        <p:blipFill>
+          <a:blip r:embed="rId3"/>
+          <a:stretch>
+            <a:fillRect/>
+          </a:stretch>
+        </p:blipFill>
+        <p:spPr>
+          <a:xfrm>
+            <a:off x="4723862" y="2235869"/>
+            <a:ext cx="4193399" cy="4524189"/>
+          </a:xfrm>
+          <a:prstGeom prst="rect">
+            <a:avLst/>
+          </a:prstGeom>
+        </p:spPr>
+      </p:pic>
+    </p:spTree>
+    <p:extLst>
+      <p:ext uri="{BB962C8B-B14F-4D97-AF65-F5344CB8AC3E}">
+        <p14:creationId xmlns:p14="http://schemas.microsoft.com/office/powerpoint/2010/main" val="441472198"/>
+      </p:ext>
+    </p:extLst>
+  </p:cSld>
+  <p:clrMapOvr>
+    <a:masterClrMapping/>
+  </p:clrMapOvr>
+  <p:transition spd="slow">
+    <p:push dir="u"/>
+  </p:transition>
+</p:sld>
+</file>
+
+<file path=ppt/slides/slide13.xml><?xml version="1.0" encoding="utf-8"?>
 <p:sld xmlns:a="http://schemas.openxmlformats.org/drawingml/2006/main" xmlns:r="http://schemas.openxmlformats.org/officeDocument/2006/relationships" xmlns:p="http://schemas.openxmlformats.org/presentationml/2006/main">
   <p:cSld>
     <p:spTree>
@@ -22262,7 +22499,7 @@
             </a:r>
             <a:r>
               <a:rPr lang="en-US" b="1" dirty="0"/>
-              <a:t>3</a:t>
+              <a:t>4</a:t>
             </a:r>
             <a:r>
               <a:rPr lang="el-GR" b="1" dirty="0"/>
@@ -22274,61 +22511,10 @@
       </p:sp>
       <p:sp>
         <p:nvSpPr>
-          <p:cNvPr id="3" name="Θέση περιεχομένου 2">
+          <p:cNvPr id="7" name="TextBox 6">
             <a:extLst>
               <a:ext uri="{FF2B5EF4-FFF2-40B4-BE49-F238E27FC236}">
-                <a16:creationId xmlns:a16="http://schemas.microsoft.com/office/drawing/2014/main" id="{08114C50-3F0F-9504-F66D-9FAB2B708481}"/>
-              </a:ext>
-            </a:extLst>
-          </p:cNvPr>
-          <p:cNvSpPr>
-            <a:spLocks noGrp="1"/>
-          </p:cNvSpPr>
-          <p:nvPr>
-            <p:ph sz="half" idx="1"/>
-          </p:nvPr>
-        </p:nvSpPr>
-        <p:spPr>
-          <a:xfrm>
-            <a:off x="1024126" y="2286000"/>
-            <a:ext cx="9050039" cy="961697"/>
-          </a:xfrm>
-        </p:spPr>
-        <p:txBody>
-          <a:bodyPr>
-            <a:normAutofit/>
-          </a:bodyPr>
-          <a:lstStyle/>
-          <a:p>
-            <a:r>
-              <a:rPr lang="el-GR" dirty="0"/>
-              <a:t>Χρήση του </a:t>
-            </a:r>
-            <a:r>
-              <a:rPr lang="en-US" dirty="0"/>
-              <a:t>warm-up phase! </a:t>
-            </a:r>
-            <a:r>
-              <a:rPr lang="el-GR" dirty="0"/>
-              <a:t>Σε κάποιο άλλο </a:t>
-            </a:r>
-            <a:r>
-              <a:rPr lang="en-US" dirty="0"/>
-              <a:t>Instance!</a:t>
-            </a:r>
-            <a:endParaRPr lang="el-GR" dirty="0"/>
-          </a:p>
-          <a:p>
-            <a:endParaRPr lang="en-US" dirty="0"/>
-          </a:p>
-        </p:txBody>
-      </p:sp>
-      <p:sp>
-        <p:nvSpPr>
-          <p:cNvPr id="4" name="TextBox 3">
-            <a:extLst>
-              <a:ext uri="{FF2B5EF4-FFF2-40B4-BE49-F238E27FC236}">
-                <a16:creationId xmlns:a16="http://schemas.microsoft.com/office/drawing/2014/main" id="{E3F7718D-C5F6-1E2D-1546-669E78D251C3}"/>
+                <a16:creationId xmlns:a16="http://schemas.microsoft.com/office/drawing/2014/main" id="{C967213A-454A-54C2-C324-820384A49FE3}"/>
               </a:ext>
             </a:extLst>
           </p:cNvPr>
@@ -22337,8 +22523,8 @@
         </p:nvSpPr>
         <p:spPr>
           <a:xfrm>
-            <a:off x="3288494" y="4244195"/>
-            <a:ext cx="5615013" cy="1446550"/>
+            <a:off x="9204609" y="2015312"/>
+            <a:ext cx="3415782" cy="3139321"/>
           </a:xfrm>
           <a:prstGeom prst="rect">
             <a:avLst/>
@@ -22352,16 +22538,128 @@
           <a:lstStyle/>
           <a:p>
             <a:r>
-              <a:rPr lang="en-US" sz="4400" dirty="0"/>
-              <a:t>Screen shot for showing what we have done</a:t>
-            </a:r>
-            <a:r>
+              <a:rPr lang="el-GR" dirty="0"/>
+              <a:t>Περίπτωση όπου:</a:t>
+            </a:r>
+            <a:br>
+              <a:rPr lang="el-GR" dirty="0"/>
+            </a:br>
+            <a:endParaRPr lang="en-GB" dirty="0"/>
+          </a:p>
+          <a:p>
+            <a:r>
+              <a:rPr lang="el-GR" dirty="0"/>
+              <a:t>Χειρισμός αποτυχίας σύνδεσης. </a:t>
+            </a:r>
+            <a:br>
+              <a:rPr lang="el-GR" dirty="0"/>
+            </a:br>
+            <a:r>
+              <a:rPr lang="el-GR" dirty="0"/>
+              <a:t> Δηλαδή, </a:t>
+            </a:r>
+            <a:br>
               <a:rPr lang="en-US" dirty="0"/>
-              <a:t>!</a:t>
-            </a:r>
+            </a:br>
+            <a:r>
+              <a:rPr lang="en-GB" dirty="0"/>
+              <a:t>How a network reacts </a:t>
+            </a:r>
+            <a:br>
+              <a:rPr lang="en-GB" dirty="0"/>
+            </a:br>
+            <a:r>
+              <a:rPr lang="en-GB" dirty="0"/>
+              <a:t>to link failures</a:t>
+            </a:r>
+          </a:p>
+          <a:p>
+            <a:r>
+              <a:rPr lang="en-GB" dirty="0"/>
+              <a:t>How routing reconverges</a:t>
+            </a:r>
+          </a:p>
+          <a:p>
+            <a:r>
+              <a:rPr lang="en-GB" dirty="0"/>
+              <a:t>How throughput collapses and </a:t>
+            </a:r>
+            <a:br>
+              <a:rPr lang="en-GB" dirty="0"/>
+            </a:br>
+            <a:r>
+              <a:rPr lang="en-GB" dirty="0"/>
+              <a:t>then recovers</a:t>
+            </a:r>
+          </a:p>
+          <a:p>
+            <a:br>
+              <a:rPr lang="el-GR" dirty="0"/>
+            </a:br>
+            <a:endParaRPr lang="en-GB" dirty="0"/>
           </a:p>
         </p:txBody>
       </p:sp>
+      <p:pic>
+        <p:nvPicPr>
+          <p:cNvPr id="5" name="Picture 4" descr="A screenshot of a computer program&#10;&#10;AI-generated content may be incorrect.">
+            <a:extLst>
+              <a:ext uri="{FF2B5EF4-FFF2-40B4-BE49-F238E27FC236}">
+                <a16:creationId xmlns:a16="http://schemas.microsoft.com/office/drawing/2014/main" id="{4EFDCF45-9009-91B9-F004-1CE34F23748B}"/>
+              </a:ext>
+            </a:extLst>
+          </p:cNvPr>
+          <p:cNvPicPr>
+            <a:picLocks noChangeAspect="1"/>
+          </p:cNvPicPr>
+          <p:nvPr/>
+        </p:nvPicPr>
+        <p:blipFill>
+          <a:blip r:embed="rId2"/>
+          <a:stretch>
+            <a:fillRect/>
+          </a:stretch>
+        </p:blipFill>
+        <p:spPr>
+          <a:xfrm>
+            <a:off x="72743" y="2085357"/>
+            <a:ext cx="4506191" cy="4723219"/>
+          </a:xfrm>
+          <a:prstGeom prst="rect">
+            <a:avLst/>
+          </a:prstGeom>
+        </p:spPr>
+      </p:pic>
+      <p:pic>
+        <p:nvPicPr>
+          <p:cNvPr id="8" name="Picture 7" descr="A screenshot of a computer&#10;&#10;AI-generated content may be incorrect.">
+            <a:extLst>
+              <a:ext uri="{FF2B5EF4-FFF2-40B4-BE49-F238E27FC236}">
+                <a16:creationId xmlns:a16="http://schemas.microsoft.com/office/drawing/2014/main" id="{C6FB2B53-CE98-3CFB-7A00-4D520A26A46B}"/>
+              </a:ext>
+            </a:extLst>
+          </p:cNvPr>
+          <p:cNvPicPr>
+            <a:picLocks noChangeAspect="1"/>
+          </p:cNvPicPr>
+          <p:nvPr/>
+        </p:nvPicPr>
+        <p:blipFill>
+          <a:blip r:embed="rId3"/>
+          <a:stretch>
+            <a:fillRect/>
+          </a:stretch>
+        </p:blipFill>
+        <p:spPr>
+          <a:xfrm>
+            <a:off x="4648839" y="2085357"/>
+            <a:ext cx="4555770" cy="4723219"/>
+          </a:xfrm>
+          <a:prstGeom prst="rect">
+            <a:avLst/>
+          </a:prstGeom>
+        </p:spPr>
+      </p:pic>
     </p:spTree>
     <p:extLst>
       <p:ext uri="{BB962C8B-B14F-4D97-AF65-F5344CB8AC3E}">
@@ -22378,7 +22676,7 @@
 </p:sld>
 </file>
 
-<file path=ppt/slides/slide13.xml><?xml version="1.0" encoding="utf-8"?>
+<file path=ppt/slides/slide14.xml><?xml version="1.0" encoding="utf-8"?>
 <p:sld xmlns:a="http://schemas.openxmlformats.org/drawingml/2006/main" xmlns:r="http://schemas.openxmlformats.org/officeDocument/2006/relationships" xmlns:p="http://schemas.openxmlformats.org/presentationml/2006/main">
   <p:cSld>
     <p:spTree>
@@ -22550,7 +22848,7 @@
 </p:sld>
 </file>
 
-<file path=ppt/slides/slide14.xml><?xml version="1.0" encoding="utf-8"?>
+<file path=ppt/slides/slide15.xml><?xml version="1.0" encoding="utf-8"?>
 <p:sld xmlns:a="http://schemas.openxmlformats.org/drawingml/2006/main" xmlns:r="http://schemas.openxmlformats.org/officeDocument/2006/relationships" xmlns:p="http://schemas.openxmlformats.org/presentationml/2006/main">
   <p:cSld>
     <p:spTree>

</xml_diff>